<commit_message>
sap-load.js: get gear interger Value instead of numericValue details.js: data displayed in summary
Signed-off-by: younGi <k.younghwan18@googlemail.com>
</commit_message>
<xml_diff>
--- a/Big Data - Driving Compitiion.pptx
+++ b/Big Data - Driving Compitiion.pptx
@@ -6842,20 +6842,20 @@
     </dgm:pt>
   </dgm:ptLst>
   <dgm:cxnLst>
-    <dgm:cxn modelId="{DF551E1B-31BD-424B-BDF9-2FEE5CDEED18}" type="presOf" srcId="{38321699-6EAC-4AD8-B27B-ACE7FFF262B6}" destId="{94DED9F9-7D3B-4917-A97F-E1AEF1F131EB}" srcOrd="0" destOrd="0" presId="urn:microsoft.com/office/officeart/2008/layout/VerticalCurvedList"/>
-    <dgm:cxn modelId="{F7B64BD6-EEFF-4977-B51C-F5FE13DE21C3}" type="presOf" srcId="{A51BC3B9-C6C3-4F90-8DEB-5FC00F55FAC3}" destId="{8ECB0D0F-B2D2-4899-8B78-A157CB1D3F6B}" srcOrd="0" destOrd="0" presId="urn:microsoft.com/office/officeart/2008/layout/VerticalCurvedList"/>
-    <dgm:cxn modelId="{E5759E99-E475-4200-9CE5-3F48B76A4C63}" type="presOf" srcId="{E95D953B-8834-475B-A90B-21464208104B}" destId="{5A5522D5-98B1-431C-862A-87D2AE6B6114}" srcOrd="0" destOrd="0" presId="urn:microsoft.com/office/officeart/2008/layout/VerticalCurvedList"/>
-    <dgm:cxn modelId="{B14053D7-E653-4001-9CED-ED4C0F94E826}" srcId="{95ECB77F-7E75-47E2-90C0-5B0DDC98D652}" destId="{87FB8AC5-8D3E-434D-AA2A-E691E1044F11}" srcOrd="5" destOrd="0" parTransId="{A0DC7861-C700-42E9-8572-8B1FF4A58B77}" sibTransId="{9C7B8D6A-BBF2-4B91-8536-09DDEF0950F6}"/>
-    <dgm:cxn modelId="{5FFF2D33-36D0-4732-A286-FA07F795F7FA}" srcId="{95ECB77F-7E75-47E2-90C0-5B0DDC98D652}" destId="{E95D953B-8834-475B-A90B-21464208104B}" srcOrd="3" destOrd="0" parTransId="{C7327062-E855-4EA7-B7F4-A7CA52F2DE57}" sibTransId="{B343315B-0F53-472F-A3F8-50E72C394E69}"/>
     <dgm:cxn modelId="{BEE2EB47-2855-42D2-AA03-68D6E06CEB79}" type="presOf" srcId="{45060046-6D24-4053-9722-CE27E4945F11}" destId="{1846E345-4193-43B8-A89A-FBAC2DEA3CE1}" srcOrd="0" destOrd="0" presId="urn:microsoft.com/office/officeart/2008/layout/VerticalCurvedList"/>
-    <dgm:cxn modelId="{516620AF-1C2B-4D03-AE69-7700D0655FC5}" srcId="{95ECB77F-7E75-47E2-90C0-5B0DDC98D652}" destId="{A51BC3B9-C6C3-4F90-8DEB-5FC00F55FAC3}" srcOrd="1" destOrd="0" parTransId="{FB4C850F-ADB2-4038-934D-454F131BB747}" sibTransId="{533DBDD4-7C73-461F-8E6E-7024B084AA9F}"/>
-    <dgm:cxn modelId="{47C04417-86FC-498B-BD14-77393C10C1DC}" type="presOf" srcId="{CD0833F7-E376-457D-A71E-09FC73BFF92B}" destId="{08F8990D-49AD-4487-90C5-A481D9A36092}" srcOrd="0" destOrd="0" presId="urn:microsoft.com/office/officeart/2008/layout/VerticalCurvedList"/>
-    <dgm:cxn modelId="{ADF612EB-E1AA-456A-A7A3-4C37D446752B}" type="presOf" srcId="{1A926AD4-CAE4-4101-AE8D-570B2C62378B}" destId="{506FFCA4-4592-4809-88A7-98FA0A62B2FE}" srcOrd="0" destOrd="0" presId="urn:microsoft.com/office/officeart/2008/layout/VerticalCurvedList"/>
-    <dgm:cxn modelId="{54C22A2C-2957-4E5B-A799-CEBDB2F2B3D6}" srcId="{95ECB77F-7E75-47E2-90C0-5B0DDC98D652}" destId="{45060046-6D24-4053-9722-CE27E4945F11}" srcOrd="4" destOrd="0" parTransId="{0C22DB43-AD4A-47E8-8690-7A0FC81803F9}" sibTransId="{9A98F613-EA9F-4553-902A-79CBE73C9130}"/>
-    <dgm:cxn modelId="{FAAB1983-77ED-4E7E-9B95-58C230122AE5}" srcId="{95ECB77F-7E75-47E2-90C0-5B0DDC98D652}" destId="{38321699-6EAC-4AD8-B27B-ACE7FFF262B6}" srcOrd="0" destOrd="0" parTransId="{BD4F7070-97CC-40EF-8C99-9322B9CA6DB3}" sibTransId="{1A926AD4-CAE4-4101-AE8D-570B2C62378B}"/>
-    <dgm:cxn modelId="{41854B80-A3E4-4FD5-A103-D70420420B0A}" type="presOf" srcId="{95ECB77F-7E75-47E2-90C0-5B0DDC98D652}" destId="{38E64900-0655-49A7-81A8-CBE292ECC20A}" srcOrd="0" destOrd="0" presId="urn:microsoft.com/office/officeart/2008/layout/VerticalCurvedList"/>
     <dgm:cxn modelId="{72457938-9B53-4279-B462-CAD957A50A6C}" srcId="{95ECB77F-7E75-47E2-90C0-5B0DDC98D652}" destId="{CD0833F7-E376-457D-A71E-09FC73BFF92B}" srcOrd="2" destOrd="0" parTransId="{D846FAC5-99A1-44AD-AC9F-8D26D376FDD3}" sibTransId="{3DA33939-57E8-47EE-992C-63D2CAB2022F}"/>
     <dgm:cxn modelId="{78A1B226-F0EC-4BEB-B691-BCF0BB22434D}" type="presOf" srcId="{87FB8AC5-8D3E-434D-AA2A-E691E1044F11}" destId="{34EAC2A8-ED4F-47AB-ABA4-B15FD3670046}" srcOrd="0" destOrd="0" presId="urn:microsoft.com/office/officeart/2008/layout/VerticalCurvedList"/>
+    <dgm:cxn modelId="{DF551E1B-31BD-424B-BDF9-2FEE5CDEED18}" type="presOf" srcId="{38321699-6EAC-4AD8-B27B-ACE7FFF262B6}" destId="{94DED9F9-7D3B-4917-A97F-E1AEF1F131EB}" srcOrd="0" destOrd="0" presId="urn:microsoft.com/office/officeart/2008/layout/VerticalCurvedList"/>
+    <dgm:cxn modelId="{516620AF-1C2B-4D03-AE69-7700D0655FC5}" srcId="{95ECB77F-7E75-47E2-90C0-5B0DDC98D652}" destId="{A51BC3B9-C6C3-4F90-8DEB-5FC00F55FAC3}" srcOrd="1" destOrd="0" parTransId="{FB4C850F-ADB2-4038-934D-454F131BB747}" sibTransId="{533DBDD4-7C73-461F-8E6E-7024B084AA9F}"/>
+    <dgm:cxn modelId="{5FFF2D33-36D0-4732-A286-FA07F795F7FA}" srcId="{95ECB77F-7E75-47E2-90C0-5B0DDC98D652}" destId="{E95D953B-8834-475B-A90B-21464208104B}" srcOrd="3" destOrd="0" parTransId="{C7327062-E855-4EA7-B7F4-A7CA52F2DE57}" sibTransId="{B343315B-0F53-472F-A3F8-50E72C394E69}"/>
+    <dgm:cxn modelId="{FAAB1983-77ED-4E7E-9B95-58C230122AE5}" srcId="{95ECB77F-7E75-47E2-90C0-5B0DDC98D652}" destId="{38321699-6EAC-4AD8-B27B-ACE7FFF262B6}" srcOrd="0" destOrd="0" parTransId="{BD4F7070-97CC-40EF-8C99-9322B9CA6DB3}" sibTransId="{1A926AD4-CAE4-4101-AE8D-570B2C62378B}"/>
+    <dgm:cxn modelId="{B14053D7-E653-4001-9CED-ED4C0F94E826}" srcId="{95ECB77F-7E75-47E2-90C0-5B0DDC98D652}" destId="{87FB8AC5-8D3E-434D-AA2A-E691E1044F11}" srcOrd="5" destOrd="0" parTransId="{A0DC7861-C700-42E9-8572-8B1FF4A58B77}" sibTransId="{9C7B8D6A-BBF2-4B91-8536-09DDEF0950F6}"/>
+    <dgm:cxn modelId="{47C04417-86FC-498B-BD14-77393C10C1DC}" type="presOf" srcId="{CD0833F7-E376-457D-A71E-09FC73BFF92B}" destId="{08F8990D-49AD-4487-90C5-A481D9A36092}" srcOrd="0" destOrd="0" presId="urn:microsoft.com/office/officeart/2008/layout/VerticalCurvedList"/>
+    <dgm:cxn modelId="{E5759E99-E475-4200-9CE5-3F48B76A4C63}" type="presOf" srcId="{E95D953B-8834-475B-A90B-21464208104B}" destId="{5A5522D5-98B1-431C-862A-87D2AE6B6114}" srcOrd="0" destOrd="0" presId="urn:microsoft.com/office/officeart/2008/layout/VerticalCurvedList"/>
+    <dgm:cxn modelId="{54C22A2C-2957-4E5B-A799-CEBDB2F2B3D6}" srcId="{95ECB77F-7E75-47E2-90C0-5B0DDC98D652}" destId="{45060046-6D24-4053-9722-CE27E4945F11}" srcOrd="4" destOrd="0" parTransId="{0C22DB43-AD4A-47E8-8690-7A0FC81803F9}" sibTransId="{9A98F613-EA9F-4553-902A-79CBE73C9130}"/>
+    <dgm:cxn modelId="{F7B64BD6-EEFF-4977-B51C-F5FE13DE21C3}" type="presOf" srcId="{A51BC3B9-C6C3-4F90-8DEB-5FC00F55FAC3}" destId="{8ECB0D0F-B2D2-4899-8B78-A157CB1D3F6B}" srcOrd="0" destOrd="0" presId="urn:microsoft.com/office/officeart/2008/layout/VerticalCurvedList"/>
+    <dgm:cxn modelId="{ADF612EB-E1AA-456A-A7A3-4C37D446752B}" type="presOf" srcId="{1A926AD4-CAE4-4101-AE8D-570B2C62378B}" destId="{506FFCA4-4592-4809-88A7-98FA0A62B2FE}" srcOrd="0" destOrd="0" presId="urn:microsoft.com/office/officeart/2008/layout/VerticalCurvedList"/>
+    <dgm:cxn modelId="{41854B80-A3E4-4FD5-A103-D70420420B0A}" type="presOf" srcId="{95ECB77F-7E75-47E2-90C0-5B0DDC98D652}" destId="{38E64900-0655-49A7-81A8-CBE292ECC20A}" srcOrd="0" destOrd="0" presId="urn:microsoft.com/office/officeart/2008/layout/VerticalCurvedList"/>
     <dgm:cxn modelId="{BB80A6C9-B112-4391-9AB4-1F3016E8C408}" type="presParOf" srcId="{38E64900-0655-49A7-81A8-CBE292ECC20A}" destId="{41921527-D604-4B3C-B292-C3FAC710B6E0}" srcOrd="0" destOrd="0" presId="urn:microsoft.com/office/officeart/2008/layout/VerticalCurvedList"/>
     <dgm:cxn modelId="{1423987F-98D3-470D-AAF2-60D4097EA5F5}" type="presParOf" srcId="{41921527-D604-4B3C-B292-C3FAC710B6E0}" destId="{24F548E7-AE07-4894-BADE-1F0E78FED5F2}" srcOrd="0" destOrd="0" presId="urn:microsoft.com/office/officeart/2008/layout/VerticalCurvedList"/>
     <dgm:cxn modelId="{28225234-F0F5-4313-A2C5-9E32A9EE7094}" type="presParOf" srcId="{24F548E7-AE07-4894-BADE-1F0E78FED5F2}" destId="{85B14CF3-E044-4530-B837-51EB3D31E253}" srcOrd="0" destOrd="0" presId="urn:microsoft.com/office/officeart/2008/layout/VerticalCurvedList"/>
@@ -7411,20 +7411,20 @@
     </dgm:pt>
   </dgm:ptLst>
   <dgm:cxnLst>
+    <dgm:cxn modelId="{516620AF-1C2B-4D03-AE69-7700D0655FC5}" srcId="{95ECB77F-7E75-47E2-90C0-5B0DDC98D652}" destId="{A51BC3B9-C6C3-4F90-8DEB-5FC00F55FAC3}" srcOrd="1" destOrd="0" parTransId="{FB4C850F-ADB2-4038-934D-454F131BB747}" sibTransId="{533DBDD4-7C73-461F-8E6E-7024B084AA9F}"/>
+    <dgm:cxn modelId="{5FFF2D33-36D0-4732-A286-FA07F795F7FA}" srcId="{95ECB77F-7E75-47E2-90C0-5B0DDC98D652}" destId="{E95D953B-8834-475B-A90B-21464208104B}" srcOrd="3" destOrd="0" parTransId="{C7327062-E855-4EA7-B7F4-A7CA52F2DE57}" sibTransId="{B343315B-0F53-472F-A3F8-50E72C394E69}"/>
+    <dgm:cxn modelId="{B14053D7-E653-4001-9CED-ED4C0F94E826}" srcId="{95ECB77F-7E75-47E2-90C0-5B0DDC98D652}" destId="{87FB8AC5-8D3E-434D-AA2A-E691E1044F11}" srcOrd="5" destOrd="0" parTransId="{A0DC7861-C700-42E9-8572-8B1FF4A58B77}" sibTransId="{9C7B8D6A-BBF2-4B91-8536-09DDEF0950F6}"/>
+    <dgm:cxn modelId="{FAAB1983-77ED-4E7E-9B95-58C230122AE5}" srcId="{95ECB77F-7E75-47E2-90C0-5B0DDC98D652}" destId="{38321699-6EAC-4AD8-B27B-ACE7FFF262B6}" srcOrd="0" destOrd="0" parTransId="{BD4F7070-97CC-40EF-8C99-9322B9CA6DB3}" sibTransId="{1A926AD4-CAE4-4101-AE8D-570B2C62378B}"/>
+    <dgm:cxn modelId="{97BFB253-4CD1-4EC1-BF38-A44EE32E7041}" type="presOf" srcId="{45060046-6D24-4053-9722-CE27E4945F11}" destId="{1846E345-4193-43B8-A89A-FBAC2DEA3CE1}" srcOrd="0" destOrd="0" presId="urn:microsoft.com/office/officeart/2008/layout/VerticalCurvedList"/>
+    <dgm:cxn modelId="{CD16FA86-09DC-409D-95E8-455E710B1723}" type="presOf" srcId="{E95D953B-8834-475B-A90B-21464208104B}" destId="{5A5522D5-98B1-431C-862A-87D2AE6B6114}" srcOrd="0" destOrd="0" presId="urn:microsoft.com/office/officeart/2008/layout/VerticalCurvedList"/>
+    <dgm:cxn modelId="{54C22A2C-2957-4E5B-A799-CEBDB2F2B3D6}" srcId="{95ECB77F-7E75-47E2-90C0-5B0DDC98D652}" destId="{45060046-6D24-4053-9722-CE27E4945F11}" srcOrd="4" destOrd="0" parTransId="{0C22DB43-AD4A-47E8-8690-7A0FC81803F9}" sibTransId="{9A98F613-EA9F-4553-902A-79CBE73C9130}"/>
+    <dgm:cxn modelId="{0D7A8B02-3679-4864-8BF0-B7916355309E}" type="presOf" srcId="{A51BC3B9-C6C3-4F90-8DEB-5FC00F55FAC3}" destId="{8ECB0D0F-B2D2-4899-8B78-A157CB1D3F6B}" srcOrd="0" destOrd="0" presId="urn:microsoft.com/office/officeart/2008/layout/VerticalCurvedList"/>
+    <dgm:cxn modelId="{7B1F762C-85CD-4986-9546-80ED24EE143D}" type="presOf" srcId="{38321699-6EAC-4AD8-B27B-ACE7FFF262B6}" destId="{94DED9F9-7D3B-4917-A97F-E1AEF1F131EB}" srcOrd="0" destOrd="0" presId="urn:microsoft.com/office/officeart/2008/layout/VerticalCurvedList"/>
+    <dgm:cxn modelId="{B0C3BD56-E49A-45BD-B49F-AF699338B469}" type="presOf" srcId="{87FB8AC5-8D3E-434D-AA2A-E691E1044F11}" destId="{34EAC2A8-ED4F-47AB-ABA4-B15FD3670046}" srcOrd="0" destOrd="0" presId="urn:microsoft.com/office/officeart/2008/layout/VerticalCurvedList"/>
+    <dgm:cxn modelId="{2BEBF359-E4F3-4673-B22F-0736E1FAEB44}" type="presOf" srcId="{1A926AD4-CAE4-4101-AE8D-570B2C62378B}" destId="{506FFCA4-4592-4809-88A7-98FA0A62B2FE}" srcOrd="0" destOrd="0" presId="urn:microsoft.com/office/officeart/2008/layout/VerticalCurvedList"/>
+    <dgm:cxn modelId="{1E01D963-0A17-47D1-AF22-5519BF601CAE}" type="presOf" srcId="{CD0833F7-E376-457D-A71E-09FC73BFF92B}" destId="{08F8990D-49AD-4487-90C5-A481D9A36092}" srcOrd="0" destOrd="0" presId="urn:microsoft.com/office/officeart/2008/layout/VerticalCurvedList"/>
     <dgm:cxn modelId="{F13829E5-C92A-4E29-9570-E460C6BFF56D}" type="presOf" srcId="{95ECB77F-7E75-47E2-90C0-5B0DDC98D652}" destId="{38E64900-0655-49A7-81A8-CBE292ECC20A}" srcOrd="0" destOrd="0" presId="urn:microsoft.com/office/officeart/2008/layout/VerticalCurvedList"/>
-    <dgm:cxn modelId="{0D7A8B02-3679-4864-8BF0-B7916355309E}" type="presOf" srcId="{A51BC3B9-C6C3-4F90-8DEB-5FC00F55FAC3}" destId="{8ECB0D0F-B2D2-4899-8B78-A157CB1D3F6B}" srcOrd="0" destOrd="0" presId="urn:microsoft.com/office/officeart/2008/layout/VerticalCurvedList"/>
-    <dgm:cxn modelId="{2BEBF359-E4F3-4673-B22F-0736E1FAEB44}" type="presOf" srcId="{1A926AD4-CAE4-4101-AE8D-570B2C62378B}" destId="{506FFCA4-4592-4809-88A7-98FA0A62B2FE}" srcOrd="0" destOrd="0" presId="urn:microsoft.com/office/officeart/2008/layout/VerticalCurvedList"/>
-    <dgm:cxn modelId="{B14053D7-E653-4001-9CED-ED4C0F94E826}" srcId="{95ECB77F-7E75-47E2-90C0-5B0DDC98D652}" destId="{87FB8AC5-8D3E-434D-AA2A-E691E1044F11}" srcOrd="5" destOrd="0" parTransId="{A0DC7861-C700-42E9-8572-8B1FF4A58B77}" sibTransId="{9C7B8D6A-BBF2-4B91-8536-09DDEF0950F6}"/>
-    <dgm:cxn modelId="{97BFB253-4CD1-4EC1-BF38-A44EE32E7041}" type="presOf" srcId="{45060046-6D24-4053-9722-CE27E4945F11}" destId="{1846E345-4193-43B8-A89A-FBAC2DEA3CE1}" srcOrd="0" destOrd="0" presId="urn:microsoft.com/office/officeart/2008/layout/VerticalCurvedList"/>
-    <dgm:cxn modelId="{5FFF2D33-36D0-4732-A286-FA07F795F7FA}" srcId="{95ECB77F-7E75-47E2-90C0-5B0DDC98D652}" destId="{E95D953B-8834-475B-A90B-21464208104B}" srcOrd="3" destOrd="0" parTransId="{C7327062-E855-4EA7-B7F4-A7CA52F2DE57}" sibTransId="{B343315B-0F53-472F-A3F8-50E72C394E69}"/>
-    <dgm:cxn modelId="{7B1F762C-85CD-4986-9546-80ED24EE143D}" type="presOf" srcId="{38321699-6EAC-4AD8-B27B-ACE7FFF262B6}" destId="{94DED9F9-7D3B-4917-A97F-E1AEF1F131EB}" srcOrd="0" destOrd="0" presId="urn:microsoft.com/office/officeart/2008/layout/VerticalCurvedList"/>
-    <dgm:cxn modelId="{516620AF-1C2B-4D03-AE69-7700D0655FC5}" srcId="{95ECB77F-7E75-47E2-90C0-5B0DDC98D652}" destId="{A51BC3B9-C6C3-4F90-8DEB-5FC00F55FAC3}" srcOrd="1" destOrd="0" parTransId="{FB4C850F-ADB2-4038-934D-454F131BB747}" sibTransId="{533DBDD4-7C73-461F-8E6E-7024B084AA9F}"/>
-    <dgm:cxn modelId="{B0C3BD56-E49A-45BD-B49F-AF699338B469}" type="presOf" srcId="{87FB8AC5-8D3E-434D-AA2A-E691E1044F11}" destId="{34EAC2A8-ED4F-47AB-ABA4-B15FD3670046}" srcOrd="0" destOrd="0" presId="urn:microsoft.com/office/officeart/2008/layout/VerticalCurvedList"/>
-    <dgm:cxn modelId="{54C22A2C-2957-4E5B-A799-CEBDB2F2B3D6}" srcId="{95ECB77F-7E75-47E2-90C0-5B0DDC98D652}" destId="{45060046-6D24-4053-9722-CE27E4945F11}" srcOrd="4" destOrd="0" parTransId="{0C22DB43-AD4A-47E8-8690-7A0FC81803F9}" sibTransId="{9A98F613-EA9F-4553-902A-79CBE73C9130}"/>
-    <dgm:cxn modelId="{FAAB1983-77ED-4E7E-9B95-58C230122AE5}" srcId="{95ECB77F-7E75-47E2-90C0-5B0DDC98D652}" destId="{38321699-6EAC-4AD8-B27B-ACE7FFF262B6}" srcOrd="0" destOrd="0" parTransId="{BD4F7070-97CC-40EF-8C99-9322B9CA6DB3}" sibTransId="{1A926AD4-CAE4-4101-AE8D-570B2C62378B}"/>
-    <dgm:cxn modelId="{1E01D963-0A17-47D1-AF22-5519BF601CAE}" type="presOf" srcId="{CD0833F7-E376-457D-A71E-09FC73BFF92B}" destId="{08F8990D-49AD-4487-90C5-A481D9A36092}" srcOrd="0" destOrd="0" presId="urn:microsoft.com/office/officeart/2008/layout/VerticalCurvedList"/>
     <dgm:cxn modelId="{72457938-9B53-4279-B462-CAD957A50A6C}" srcId="{95ECB77F-7E75-47E2-90C0-5B0DDC98D652}" destId="{CD0833F7-E376-457D-A71E-09FC73BFF92B}" srcOrd="2" destOrd="0" parTransId="{D846FAC5-99A1-44AD-AC9F-8D26D376FDD3}" sibTransId="{3DA33939-57E8-47EE-992C-63D2CAB2022F}"/>
-    <dgm:cxn modelId="{CD16FA86-09DC-409D-95E8-455E710B1723}" type="presOf" srcId="{E95D953B-8834-475B-A90B-21464208104B}" destId="{5A5522D5-98B1-431C-862A-87D2AE6B6114}" srcOrd="0" destOrd="0" presId="urn:microsoft.com/office/officeart/2008/layout/VerticalCurvedList"/>
     <dgm:cxn modelId="{5E9CADF9-E1F3-4904-B8EF-DDD662EA1027}" type="presParOf" srcId="{38E64900-0655-49A7-81A8-CBE292ECC20A}" destId="{41921527-D604-4B3C-B292-C3FAC710B6E0}" srcOrd="0" destOrd="0" presId="urn:microsoft.com/office/officeart/2008/layout/VerticalCurvedList"/>
     <dgm:cxn modelId="{7514AFD1-C1AB-4FF7-A779-C5A31EDA8688}" type="presParOf" srcId="{41921527-D604-4B3C-B292-C3FAC710B6E0}" destId="{24F548E7-AE07-4894-BADE-1F0E78FED5F2}" srcOrd="0" destOrd="0" presId="urn:microsoft.com/office/officeart/2008/layout/VerticalCurvedList"/>
     <dgm:cxn modelId="{7151021E-454D-4400-95AE-223C42AB7940}" type="presParOf" srcId="{24F548E7-AE07-4894-BADE-1F0E78FED5F2}" destId="{85B14CF3-E044-4530-B837-51EB3D31E253}" srcOrd="0" destOrd="0" presId="urn:microsoft.com/office/officeart/2008/layout/VerticalCurvedList"/>
@@ -7980,20 +7980,20 @@
     </dgm:pt>
   </dgm:ptLst>
   <dgm:cxnLst>
+    <dgm:cxn modelId="{516620AF-1C2B-4D03-AE69-7700D0655FC5}" srcId="{95ECB77F-7E75-47E2-90C0-5B0DDC98D652}" destId="{A51BC3B9-C6C3-4F90-8DEB-5FC00F55FAC3}" srcOrd="1" destOrd="0" parTransId="{FB4C850F-ADB2-4038-934D-454F131BB747}" sibTransId="{533DBDD4-7C73-461F-8E6E-7024B084AA9F}"/>
     <dgm:cxn modelId="{F837E7A3-2B05-4144-9DF6-CCD678B94268}" type="presOf" srcId="{CD0833F7-E376-457D-A71E-09FC73BFF92B}" destId="{08F8990D-49AD-4487-90C5-A481D9A36092}" srcOrd="0" destOrd="0" presId="urn:microsoft.com/office/officeart/2008/layout/VerticalCurvedList"/>
+    <dgm:cxn modelId="{ED208BF1-0905-4C84-927E-D8854D1EF74E}" type="presOf" srcId="{87FB8AC5-8D3E-434D-AA2A-E691E1044F11}" destId="{34EAC2A8-ED4F-47AB-ABA4-B15FD3670046}" srcOrd="0" destOrd="0" presId="urn:microsoft.com/office/officeart/2008/layout/VerticalCurvedList"/>
+    <dgm:cxn modelId="{A4BB2906-C715-48D7-8FB8-0894F16806CC}" type="presOf" srcId="{95ECB77F-7E75-47E2-90C0-5B0DDC98D652}" destId="{38E64900-0655-49A7-81A8-CBE292ECC20A}" srcOrd="0" destOrd="0" presId="urn:microsoft.com/office/officeart/2008/layout/VerticalCurvedList"/>
+    <dgm:cxn modelId="{5FFF2D33-36D0-4732-A286-FA07F795F7FA}" srcId="{95ECB77F-7E75-47E2-90C0-5B0DDC98D652}" destId="{E95D953B-8834-475B-A90B-21464208104B}" srcOrd="3" destOrd="0" parTransId="{C7327062-E855-4EA7-B7F4-A7CA52F2DE57}" sibTransId="{B343315B-0F53-472F-A3F8-50E72C394E69}"/>
+    <dgm:cxn modelId="{B14053D7-E653-4001-9CED-ED4C0F94E826}" srcId="{95ECB77F-7E75-47E2-90C0-5B0DDC98D652}" destId="{87FB8AC5-8D3E-434D-AA2A-E691E1044F11}" srcOrd="5" destOrd="0" parTransId="{A0DC7861-C700-42E9-8572-8B1FF4A58B77}" sibTransId="{9C7B8D6A-BBF2-4B91-8536-09DDEF0950F6}"/>
+    <dgm:cxn modelId="{FEAC6C6D-A73D-4AFA-AC7E-82E3DAC4F4E4}" type="presOf" srcId="{A51BC3B9-C6C3-4F90-8DEB-5FC00F55FAC3}" destId="{8ECB0D0F-B2D2-4899-8B78-A157CB1D3F6B}" srcOrd="0" destOrd="0" presId="urn:microsoft.com/office/officeart/2008/layout/VerticalCurvedList"/>
+    <dgm:cxn modelId="{FAAB1983-77ED-4E7E-9B95-58C230122AE5}" srcId="{95ECB77F-7E75-47E2-90C0-5B0DDC98D652}" destId="{38321699-6EAC-4AD8-B27B-ACE7FFF262B6}" srcOrd="0" destOrd="0" parTransId="{BD4F7070-97CC-40EF-8C99-9322B9CA6DB3}" sibTransId="{1A926AD4-CAE4-4101-AE8D-570B2C62378B}"/>
     <dgm:cxn modelId="{54C22A2C-2957-4E5B-A799-CEBDB2F2B3D6}" srcId="{95ECB77F-7E75-47E2-90C0-5B0DDC98D652}" destId="{45060046-6D24-4053-9722-CE27E4945F11}" srcOrd="4" destOrd="0" parTransId="{0C22DB43-AD4A-47E8-8690-7A0FC81803F9}" sibTransId="{9A98F613-EA9F-4553-902A-79CBE73C9130}"/>
-    <dgm:cxn modelId="{FEAC6C6D-A73D-4AFA-AC7E-82E3DAC4F4E4}" type="presOf" srcId="{A51BC3B9-C6C3-4F90-8DEB-5FC00F55FAC3}" destId="{8ECB0D0F-B2D2-4899-8B78-A157CB1D3F6B}" srcOrd="0" destOrd="0" presId="urn:microsoft.com/office/officeart/2008/layout/VerticalCurvedList"/>
-    <dgm:cxn modelId="{A4BB2906-C715-48D7-8FB8-0894F16806CC}" type="presOf" srcId="{95ECB77F-7E75-47E2-90C0-5B0DDC98D652}" destId="{38E64900-0655-49A7-81A8-CBE292ECC20A}" srcOrd="0" destOrd="0" presId="urn:microsoft.com/office/officeart/2008/layout/VerticalCurvedList"/>
     <dgm:cxn modelId="{C5ED56E1-87F2-4F94-97E9-CCF361235724}" type="presOf" srcId="{45060046-6D24-4053-9722-CE27E4945F11}" destId="{1846E345-4193-43B8-A89A-FBAC2DEA3CE1}" srcOrd="0" destOrd="0" presId="urn:microsoft.com/office/officeart/2008/layout/VerticalCurvedList"/>
-    <dgm:cxn modelId="{9A797A83-20B1-45C3-BE18-24AB279B8AEE}" type="presOf" srcId="{38321699-6EAC-4AD8-B27B-ACE7FFF262B6}" destId="{94DED9F9-7D3B-4917-A97F-E1AEF1F131EB}" srcOrd="0" destOrd="0" presId="urn:microsoft.com/office/officeart/2008/layout/VerticalCurvedList"/>
-    <dgm:cxn modelId="{516620AF-1C2B-4D03-AE69-7700D0655FC5}" srcId="{95ECB77F-7E75-47E2-90C0-5B0DDC98D652}" destId="{A51BC3B9-C6C3-4F90-8DEB-5FC00F55FAC3}" srcOrd="1" destOrd="0" parTransId="{FB4C850F-ADB2-4038-934D-454F131BB747}" sibTransId="{533DBDD4-7C73-461F-8E6E-7024B084AA9F}"/>
-    <dgm:cxn modelId="{ED208BF1-0905-4C84-927E-D8854D1EF74E}" type="presOf" srcId="{87FB8AC5-8D3E-434D-AA2A-E691E1044F11}" destId="{34EAC2A8-ED4F-47AB-ABA4-B15FD3670046}" srcOrd="0" destOrd="0" presId="urn:microsoft.com/office/officeart/2008/layout/VerticalCurvedList"/>
-    <dgm:cxn modelId="{B14053D7-E653-4001-9CED-ED4C0F94E826}" srcId="{95ECB77F-7E75-47E2-90C0-5B0DDC98D652}" destId="{87FB8AC5-8D3E-434D-AA2A-E691E1044F11}" srcOrd="5" destOrd="0" parTransId="{A0DC7861-C700-42E9-8572-8B1FF4A58B77}" sibTransId="{9C7B8D6A-BBF2-4B91-8536-09DDEF0950F6}"/>
-    <dgm:cxn modelId="{FAAB1983-77ED-4E7E-9B95-58C230122AE5}" srcId="{95ECB77F-7E75-47E2-90C0-5B0DDC98D652}" destId="{38321699-6EAC-4AD8-B27B-ACE7FFF262B6}" srcOrd="0" destOrd="0" parTransId="{BD4F7070-97CC-40EF-8C99-9322B9CA6DB3}" sibTransId="{1A926AD4-CAE4-4101-AE8D-570B2C62378B}"/>
     <dgm:cxn modelId="{39F90D4A-7135-4C76-9E86-19B4D1902525}" type="presOf" srcId="{1A926AD4-CAE4-4101-AE8D-570B2C62378B}" destId="{506FFCA4-4592-4809-88A7-98FA0A62B2FE}" srcOrd="0" destOrd="0" presId="urn:microsoft.com/office/officeart/2008/layout/VerticalCurvedList"/>
     <dgm:cxn modelId="{7FC0D8EE-3B2A-4636-BF1F-AF268860819D}" type="presOf" srcId="{E95D953B-8834-475B-A90B-21464208104B}" destId="{5A5522D5-98B1-431C-862A-87D2AE6B6114}" srcOrd="0" destOrd="0" presId="urn:microsoft.com/office/officeart/2008/layout/VerticalCurvedList"/>
-    <dgm:cxn modelId="{5FFF2D33-36D0-4732-A286-FA07F795F7FA}" srcId="{95ECB77F-7E75-47E2-90C0-5B0DDC98D652}" destId="{E95D953B-8834-475B-A90B-21464208104B}" srcOrd="3" destOrd="0" parTransId="{C7327062-E855-4EA7-B7F4-A7CA52F2DE57}" sibTransId="{B343315B-0F53-472F-A3F8-50E72C394E69}"/>
     <dgm:cxn modelId="{72457938-9B53-4279-B462-CAD957A50A6C}" srcId="{95ECB77F-7E75-47E2-90C0-5B0DDC98D652}" destId="{CD0833F7-E376-457D-A71E-09FC73BFF92B}" srcOrd="2" destOrd="0" parTransId="{D846FAC5-99A1-44AD-AC9F-8D26D376FDD3}" sibTransId="{3DA33939-57E8-47EE-992C-63D2CAB2022F}"/>
+    <dgm:cxn modelId="{9A797A83-20B1-45C3-BE18-24AB279B8AEE}" type="presOf" srcId="{38321699-6EAC-4AD8-B27B-ACE7FFF262B6}" destId="{94DED9F9-7D3B-4917-A97F-E1AEF1F131EB}" srcOrd="0" destOrd="0" presId="urn:microsoft.com/office/officeart/2008/layout/VerticalCurvedList"/>
     <dgm:cxn modelId="{F9ACA018-FCDC-499A-B6AB-8D848426B5D2}" type="presParOf" srcId="{38E64900-0655-49A7-81A8-CBE292ECC20A}" destId="{41921527-D604-4B3C-B292-C3FAC710B6E0}" srcOrd="0" destOrd="0" presId="urn:microsoft.com/office/officeart/2008/layout/VerticalCurvedList"/>
     <dgm:cxn modelId="{89E5C1AF-89C6-4465-AE9E-43F05C20275A}" type="presParOf" srcId="{41921527-D604-4B3C-B292-C3FAC710B6E0}" destId="{24F548E7-AE07-4894-BADE-1F0E78FED5F2}" srcOrd="0" destOrd="0" presId="urn:microsoft.com/office/officeart/2008/layout/VerticalCurvedList"/>
     <dgm:cxn modelId="{B4B46AD3-FFF7-4D08-8540-B4AD3A54C91B}" type="presParOf" srcId="{24F548E7-AE07-4894-BADE-1F0E78FED5F2}" destId="{85B14CF3-E044-4530-B837-51EB3D31E253}" srcOrd="0" destOrd="0" presId="urn:microsoft.com/office/officeart/2008/layout/VerticalCurvedList"/>
@@ -26520,7 +26520,7 @@
             <a:fld id="{A32DC80D-291A-4ABB-A78B-0417274A267C}" type="datetime4">
               <a:rPr lang="de-DE"/>
               <a:pPr/>
-              <a:t>7. Juli 2015</a:t>
+              <a:t>9. Juli 2015</a:t>
             </a:fld>
             <a:endParaRPr lang="de-DE"/>
           </a:p>
@@ -26903,7 +26903,7 @@
             <a:fld id="{065B079B-E513-489A-8A1B-D7C78493EA86}" type="datetime4">
               <a:rPr lang="de-DE"/>
               <a:pPr/>
-              <a:t>7. Juli 2015</a:t>
+              <a:t>9. Juli 2015</a:t>
             </a:fld>
             <a:endParaRPr lang="de-DE"/>
           </a:p>
@@ -27836,7 +27836,7 @@
                 <a:tabLst/>
                 <a:defRPr/>
               </a:pPr>
-              <a:t>07.07.2015</a:t>
+              <a:t>09.07.2015</a:t>
             </a:fld>
             <a:r>
               <a:rPr kumimoji="0" lang="de-DE" sz="1000" b="0" i="0" u="none" strike="noStrike" kern="1200" cap="none" spc="0" normalizeH="0" baseline="0" noProof="0" dirty="0" smtClean="0">
@@ -29605,7 +29605,7 @@
                 <a:tabLst/>
                 <a:defRPr/>
               </a:pPr>
-              <a:t>07.07.2015</a:t>
+              <a:t>09.07.2015</a:t>
             </a:fld>
             <a:r>
               <a:rPr kumimoji="0" lang="de-DE" sz="1000" b="0" i="0" u="none" strike="noStrike" kern="1200" cap="none" spc="0" normalizeH="0" baseline="0" noProof="0" dirty="0" smtClean="0">
@@ -30661,9 +30661,30 @@
           <a:bodyPr/>
           <a:lstStyle/>
           <a:p>
+            <a:pPr>
+              <a:lnSpc>
+                <a:spcPct val="100000"/>
+              </a:lnSpc>
+            </a:pPr>
             <a:r>
               <a:rPr lang="de-DE" dirty="0" smtClean="0"/>
-              <a:t>Wir bedanken uns für die Aufmerksamkeit und hoffen auf eine rege Diskussion</a:t>
+              <a:t>Wir bedanken uns für die Aufmerksamkeit und </a:t>
+            </a:r>
+            <a:endParaRPr lang="de-DE" dirty="0" smtClean="0"/>
+          </a:p>
+          <a:p>
+            <a:pPr>
+              <a:lnSpc>
+                <a:spcPct val="100000"/>
+              </a:lnSpc>
+            </a:pPr>
+            <a:r>
+              <a:rPr lang="de-DE" dirty="0" smtClean="0"/>
+              <a:t>hoffen </a:t>
+            </a:r>
+            <a:r>
+              <a:rPr lang="de-DE" dirty="0" smtClean="0"/>
+              <a:t>auf eine rege Diskussion</a:t>
             </a:r>
             <a:endParaRPr lang="de-DE" dirty="0"/>
           </a:p>
@@ -30722,7 +30743,7 @@
   </p:clrMapOvr>
   <mc:AlternateContent xmlns:mc="http://schemas.openxmlformats.org/markup-compatibility/2006">
     <mc:Choice xmlns:p14="http://schemas.microsoft.com/office/powerpoint/2010/main" Requires="p14">
-      <p:transition p14:dur="0"/>
+      <p:transition p14:dur="10"/>
     </mc:Choice>
     <mc:Fallback>
       <p:transition/>

</xml_diff>

<commit_message>
Präsi desing angepasst Signed-off-by: younGi <k.younghwan18@googlemail.com>
</commit_message>
<xml_diff>
--- a/Big Data - Driving Compitiion.pptx
+++ b/Big Data - Driving Compitiion.pptx
@@ -6842,20 +6842,20 @@
     </dgm:pt>
   </dgm:ptLst>
   <dgm:cxnLst>
+    <dgm:cxn modelId="{DF551E1B-31BD-424B-BDF9-2FEE5CDEED18}" type="presOf" srcId="{38321699-6EAC-4AD8-B27B-ACE7FFF262B6}" destId="{94DED9F9-7D3B-4917-A97F-E1AEF1F131EB}" srcOrd="0" destOrd="0" presId="urn:microsoft.com/office/officeart/2008/layout/VerticalCurvedList"/>
+    <dgm:cxn modelId="{F7B64BD6-EEFF-4977-B51C-F5FE13DE21C3}" type="presOf" srcId="{A51BC3B9-C6C3-4F90-8DEB-5FC00F55FAC3}" destId="{8ECB0D0F-B2D2-4899-8B78-A157CB1D3F6B}" srcOrd="0" destOrd="0" presId="urn:microsoft.com/office/officeart/2008/layout/VerticalCurvedList"/>
+    <dgm:cxn modelId="{E5759E99-E475-4200-9CE5-3F48B76A4C63}" type="presOf" srcId="{E95D953B-8834-475B-A90B-21464208104B}" destId="{5A5522D5-98B1-431C-862A-87D2AE6B6114}" srcOrd="0" destOrd="0" presId="urn:microsoft.com/office/officeart/2008/layout/VerticalCurvedList"/>
+    <dgm:cxn modelId="{B14053D7-E653-4001-9CED-ED4C0F94E826}" srcId="{95ECB77F-7E75-47E2-90C0-5B0DDC98D652}" destId="{87FB8AC5-8D3E-434D-AA2A-E691E1044F11}" srcOrd="5" destOrd="0" parTransId="{A0DC7861-C700-42E9-8572-8B1FF4A58B77}" sibTransId="{9C7B8D6A-BBF2-4B91-8536-09DDEF0950F6}"/>
+    <dgm:cxn modelId="{5FFF2D33-36D0-4732-A286-FA07F795F7FA}" srcId="{95ECB77F-7E75-47E2-90C0-5B0DDC98D652}" destId="{E95D953B-8834-475B-A90B-21464208104B}" srcOrd="3" destOrd="0" parTransId="{C7327062-E855-4EA7-B7F4-A7CA52F2DE57}" sibTransId="{B343315B-0F53-472F-A3F8-50E72C394E69}"/>
     <dgm:cxn modelId="{BEE2EB47-2855-42D2-AA03-68D6E06CEB79}" type="presOf" srcId="{45060046-6D24-4053-9722-CE27E4945F11}" destId="{1846E345-4193-43B8-A89A-FBAC2DEA3CE1}" srcOrd="0" destOrd="0" presId="urn:microsoft.com/office/officeart/2008/layout/VerticalCurvedList"/>
+    <dgm:cxn modelId="{516620AF-1C2B-4D03-AE69-7700D0655FC5}" srcId="{95ECB77F-7E75-47E2-90C0-5B0DDC98D652}" destId="{A51BC3B9-C6C3-4F90-8DEB-5FC00F55FAC3}" srcOrd="1" destOrd="0" parTransId="{FB4C850F-ADB2-4038-934D-454F131BB747}" sibTransId="{533DBDD4-7C73-461F-8E6E-7024B084AA9F}"/>
+    <dgm:cxn modelId="{47C04417-86FC-498B-BD14-77393C10C1DC}" type="presOf" srcId="{CD0833F7-E376-457D-A71E-09FC73BFF92B}" destId="{08F8990D-49AD-4487-90C5-A481D9A36092}" srcOrd="0" destOrd="0" presId="urn:microsoft.com/office/officeart/2008/layout/VerticalCurvedList"/>
+    <dgm:cxn modelId="{ADF612EB-E1AA-456A-A7A3-4C37D446752B}" type="presOf" srcId="{1A926AD4-CAE4-4101-AE8D-570B2C62378B}" destId="{506FFCA4-4592-4809-88A7-98FA0A62B2FE}" srcOrd="0" destOrd="0" presId="urn:microsoft.com/office/officeart/2008/layout/VerticalCurvedList"/>
+    <dgm:cxn modelId="{54C22A2C-2957-4E5B-A799-CEBDB2F2B3D6}" srcId="{95ECB77F-7E75-47E2-90C0-5B0DDC98D652}" destId="{45060046-6D24-4053-9722-CE27E4945F11}" srcOrd="4" destOrd="0" parTransId="{0C22DB43-AD4A-47E8-8690-7A0FC81803F9}" sibTransId="{9A98F613-EA9F-4553-902A-79CBE73C9130}"/>
+    <dgm:cxn modelId="{FAAB1983-77ED-4E7E-9B95-58C230122AE5}" srcId="{95ECB77F-7E75-47E2-90C0-5B0DDC98D652}" destId="{38321699-6EAC-4AD8-B27B-ACE7FFF262B6}" srcOrd="0" destOrd="0" parTransId="{BD4F7070-97CC-40EF-8C99-9322B9CA6DB3}" sibTransId="{1A926AD4-CAE4-4101-AE8D-570B2C62378B}"/>
+    <dgm:cxn modelId="{41854B80-A3E4-4FD5-A103-D70420420B0A}" type="presOf" srcId="{95ECB77F-7E75-47E2-90C0-5B0DDC98D652}" destId="{38E64900-0655-49A7-81A8-CBE292ECC20A}" srcOrd="0" destOrd="0" presId="urn:microsoft.com/office/officeart/2008/layout/VerticalCurvedList"/>
     <dgm:cxn modelId="{72457938-9B53-4279-B462-CAD957A50A6C}" srcId="{95ECB77F-7E75-47E2-90C0-5B0DDC98D652}" destId="{CD0833F7-E376-457D-A71E-09FC73BFF92B}" srcOrd="2" destOrd="0" parTransId="{D846FAC5-99A1-44AD-AC9F-8D26D376FDD3}" sibTransId="{3DA33939-57E8-47EE-992C-63D2CAB2022F}"/>
     <dgm:cxn modelId="{78A1B226-F0EC-4BEB-B691-BCF0BB22434D}" type="presOf" srcId="{87FB8AC5-8D3E-434D-AA2A-E691E1044F11}" destId="{34EAC2A8-ED4F-47AB-ABA4-B15FD3670046}" srcOrd="0" destOrd="0" presId="urn:microsoft.com/office/officeart/2008/layout/VerticalCurvedList"/>
-    <dgm:cxn modelId="{DF551E1B-31BD-424B-BDF9-2FEE5CDEED18}" type="presOf" srcId="{38321699-6EAC-4AD8-B27B-ACE7FFF262B6}" destId="{94DED9F9-7D3B-4917-A97F-E1AEF1F131EB}" srcOrd="0" destOrd="0" presId="urn:microsoft.com/office/officeart/2008/layout/VerticalCurvedList"/>
-    <dgm:cxn modelId="{516620AF-1C2B-4D03-AE69-7700D0655FC5}" srcId="{95ECB77F-7E75-47E2-90C0-5B0DDC98D652}" destId="{A51BC3B9-C6C3-4F90-8DEB-5FC00F55FAC3}" srcOrd="1" destOrd="0" parTransId="{FB4C850F-ADB2-4038-934D-454F131BB747}" sibTransId="{533DBDD4-7C73-461F-8E6E-7024B084AA9F}"/>
-    <dgm:cxn modelId="{5FFF2D33-36D0-4732-A286-FA07F795F7FA}" srcId="{95ECB77F-7E75-47E2-90C0-5B0DDC98D652}" destId="{E95D953B-8834-475B-A90B-21464208104B}" srcOrd="3" destOrd="0" parTransId="{C7327062-E855-4EA7-B7F4-A7CA52F2DE57}" sibTransId="{B343315B-0F53-472F-A3F8-50E72C394E69}"/>
-    <dgm:cxn modelId="{FAAB1983-77ED-4E7E-9B95-58C230122AE5}" srcId="{95ECB77F-7E75-47E2-90C0-5B0DDC98D652}" destId="{38321699-6EAC-4AD8-B27B-ACE7FFF262B6}" srcOrd="0" destOrd="0" parTransId="{BD4F7070-97CC-40EF-8C99-9322B9CA6DB3}" sibTransId="{1A926AD4-CAE4-4101-AE8D-570B2C62378B}"/>
-    <dgm:cxn modelId="{B14053D7-E653-4001-9CED-ED4C0F94E826}" srcId="{95ECB77F-7E75-47E2-90C0-5B0DDC98D652}" destId="{87FB8AC5-8D3E-434D-AA2A-E691E1044F11}" srcOrd="5" destOrd="0" parTransId="{A0DC7861-C700-42E9-8572-8B1FF4A58B77}" sibTransId="{9C7B8D6A-BBF2-4B91-8536-09DDEF0950F6}"/>
-    <dgm:cxn modelId="{47C04417-86FC-498B-BD14-77393C10C1DC}" type="presOf" srcId="{CD0833F7-E376-457D-A71E-09FC73BFF92B}" destId="{08F8990D-49AD-4487-90C5-A481D9A36092}" srcOrd="0" destOrd="0" presId="urn:microsoft.com/office/officeart/2008/layout/VerticalCurvedList"/>
-    <dgm:cxn modelId="{E5759E99-E475-4200-9CE5-3F48B76A4C63}" type="presOf" srcId="{E95D953B-8834-475B-A90B-21464208104B}" destId="{5A5522D5-98B1-431C-862A-87D2AE6B6114}" srcOrd="0" destOrd="0" presId="urn:microsoft.com/office/officeart/2008/layout/VerticalCurvedList"/>
-    <dgm:cxn modelId="{54C22A2C-2957-4E5B-A799-CEBDB2F2B3D6}" srcId="{95ECB77F-7E75-47E2-90C0-5B0DDC98D652}" destId="{45060046-6D24-4053-9722-CE27E4945F11}" srcOrd="4" destOrd="0" parTransId="{0C22DB43-AD4A-47E8-8690-7A0FC81803F9}" sibTransId="{9A98F613-EA9F-4553-902A-79CBE73C9130}"/>
-    <dgm:cxn modelId="{F7B64BD6-EEFF-4977-B51C-F5FE13DE21C3}" type="presOf" srcId="{A51BC3B9-C6C3-4F90-8DEB-5FC00F55FAC3}" destId="{8ECB0D0F-B2D2-4899-8B78-A157CB1D3F6B}" srcOrd="0" destOrd="0" presId="urn:microsoft.com/office/officeart/2008/layout/VerticalCurvedList"/>
-    <dgm:cxn modelId="{ADF612EB-E1AA-456A-A7A3-4C37D446752B}" type="presOf" srcId="{1A926AD4-CAE4-4101-AE8D-570B2C62378B}" destId="{506FFCA4-4592-4809-88A7-98FA0A62B2FE}" srcOrd="0" destOrd="0" presId="urn:microsoft.com/office/officeart/2008/layout/VerticalCurvedList"/>
-    <dgm:cxn modelId="{41854B80-A3E4-4FD5-A103-D70420420B0A}" type="presOf" srcId="{95ECB77F-7E75-47E2-90C0-5B0DDC98D652}" destId="{38E64900-0655-49A7-81A8-CBE292ECC20A}" srcOrd="0" destOrd="0" presId="urn:microsoft.com/office/officeart/2008/layout/VerticalCurvedList"/>
     <dgm:cxn modelId="{BB80A6C9-B112-4391-9AB4-1F3016E8C408}" type="presParOf" srcId="{38E64900-0655-49A7-81A8-CBE292ECC20A}" destId="{41921527-D604-4B3C-B292-C3FAC710B6E0}" srcOrd="0" destOrd="0" presId="urn:microsoft.com/office/officeart/2008/layout/VerticalCurvedList"/>
     <dgm:cxn modelId="{1423987F-98D3-470D-AAF2-60D4097EA5F5}" type="presParOf" srcId="{41921527-D604-4B3C-B292-C3FAC710B6E0}" destId="{24F548E7-AE07-4894-BADE-1F0E78FED5F2}" srcOrd="0" destOrd="0" presId="urn:microsoft.com/office/officeart/2008/layout/VerticalCurvedList"/>
     <dgm:cxn modelId="{28225234-F0F5-4313-A2C5-9E32A9EE7094}" type="presParOf" srcId="{24F548E7-AE07-4894-BADE-1F0E78FED5F2}" destId="{85B14CF3-E044-4530-B837-51EB3D31E253}" srcOrd="0" destOrd="0" presId="urn:microsoft.com/office/officeart/2008/layout/VerticalCurvedList"/>
@@ -27501,7 +27501,7 @@
             <a:avLst/>
           </a:prstGeom>
           <a:solidFill>
-            <a:schemeClr val="accent2"/>
+            <a:srgbClr val="005AA9"/>
           </a:solidFill>
           <a:ln w="9525">
             <a:noFill/>
@@ -27567,7 +27567,7 @@
           <p:cNvSpPr>
             <a:spLocks noChangeArrowheads="1"/>
           </p:cNvSpPr>
-          <p:nvPr/>
+          <p:nvPr userDrawn="1"/>
         </p:nvSpPr>
         <p:spPr bwMode="auto">
           <a:xfrm>
@@ -27578,7 +27578,7 @@
             <a:avLst/>
           </a:prstGeom>
           <a:solidFill>
-            <a:schemeClr val="accent2"/>
+            <a:srgbClr val="005AA9"/>
           </a:solidFill>
           <a:ln w="3175">
             <a:noFill/>
@@ -27764,7 +27764,7 @@
       </p:sp>
       <p:sp>
         <p:nvSpPr>
-          <p:cNvPr id="15" name="Fußzeilenplatzhalter 3"/>
+          <p:cNvPr id="13" name="Fußzeilenplatzhalter 3"/>
           <p:cNvSpPr txBox="1">
             <a:spLocks/>
           </p:cNvSpPr>
@@ -27853,7 +27853,160 @@
                 <a:ea typeface="+mn-ea"/>
                 <a:cs typeface="Tahoma" pitchFamily="34" charset="0"/>
               </a:rPr>
-              <a:t>  |  Fachbereich BBBBB  |  Institut AAAA  |  Prof. TTTTTT  |  </a:t>
+              <a:t>  |  Fachbereich </a:t>
+            </a:r>
+            <a:r>
+              <a:rPr kumimoji="0" lang="de-DE" sz="1000" b="0" i="0" u="none" strike="noStrike" kern="1200" cap="none" spc="0" normalizeH="0" baseline="0" noProof="0" dirty="0" smtClean="0">
+                <a:ln>
+                  <a:noFill/>
+                </a:ln>
+                <a:solidFill>
+                  <a:schemeClr val="tx1"/>
+                </a:solidFill>
+                <a:effectLst/>
+                <a:uLnTx/>
+                <a:uFillTx/>
+                <a:latin typeface="+mn-lt"/>
+                <a:ea typeface="+mn-ea"/>
+                <a:cs typeface="Tahoma" pitchFamily="34" charset="0"/>
+              </a:rPr>
+              <a:t>1 |  Prof</a:t>
+            </a:r>
+            <a:r>
+              <a:rPr kumimoji="0" lang="de-DE" sz="1000" b="0" i="0" u="none" strike="noStrike" kern="1200" cap="none" spc="0" normalizeH="0" baseline="0" noProof="0" dirty="0" smtClean="0">
+                <a:ln>
+                  <a:noFill/>
+                </a:ln>
+                <a:solidFill>
+                  <a:schemeClr val="tx1"/>
+                </a:solidFill>
+                <a:effectLst/>
+                <a:uLnTx/>
+                <a:uFillTx/>
+                <a:latin typeface="+mn-lt"/>
+                <a:ea typeface="+mn-ea"/>
+                <a:cs typeface="Tahoma" pitchFamily="34" charset="0"/>
+              </a:rPr>
+              <a:t>. </a:t>
+            </a:r>
+            <a:r>
+              <a:rPr kumimoji="0" lang="de-DE" sz="1000" b="0" i="0" u="none" strike="noStrike" kern="1200" cap="none" spc="0" normalizeH="0" baseline="0" noProof="0" dirty="0" smtClean="0">
+                <a:ln>
+                  <a:noFill/>
+                </a:ln>
+                <a:solidFill>
+                  <a:schemeClr val="tx1"/>
+                </a:solidFill>
+                <a:effectLst/>
+                <a:uLnTx/>
+                <a:uFillTx/>
+                <a:latin typeface="+mn-lt"/>
+                <a:ea typeface="+mn-ea"/>
+                <a:cs typeface="Tahoma" pitchFamily="34" charset="0"/>
+              </a:rPr>
+              <a:t>Dr. </a:t>
+            </a:r>
+            <a:r>
+              <a:rPr kumimoji="0" lang="de-DE" sz="1000" b="0" i="0" u="none" strike="noStrike" kern="1200" cap="none" spc="0" normalizeH="0" baseline="0" noProof="0" dirty="0" err="1" smtClean="0">
+                <a:ln>
+                  <a:noFill/>
+                </a:ln>
+                <a:solidFill>
+                  <a:schemeClr val="tx1"/>
+                </a:solidFill>
+                <a:effectLst/>
+                <a:uLnTx/>
+                <a:uFillTx/>
+                <a:latin typeface="+mn-lt"/>
+                <a:ea typeface="+mn-ea"/>
+                <a:cs typeface="Tahoma" pitchFamily="34" charset="0"/>
+              </a:rPr>
+              <a:t>Buxmann</a:t>
+            </a:r>
+            <a:r>
+              <a:rPr kumimoji="0" lang="de-DE" sz="1000" b="0" i="0" u="none" strike="noStrike" kern="1200" cap="none" spc="0" normalizeH="0" baseline="0" noProof="0" dirty="0" smtClean="0">
+                <a:ln>
+                  <a:noFill/>
+                </a:ln>
+                <a:solidFill>
+                  <a:schemeClr val="tx1"/>
+                </a:solidFill>
+                <a:effectLst/>
+                <a:uLnTx/>
+                <a:uFillTx/>
+                <a:latin typeface="+mn-lt"/>
+                <a:ea typeface="+mn-ea"/>
+                <a:cs typeface="Tahoma" pitchFamily="34" charset="0"/>
+              </a:rPr>
+              <a:t> | Projekt: „ </a:t>
+            </a:r>
+            <a:r>
+              <a:rPr kumimoji="0" lang="de-DE" sz="1000" b="0" i="0" u="none" strike="noStrike" kern="1200" cap="none" spc="0" normalizeH="0" baseline="0" noProof="0" dirty="0" err="1" smtClean="0">
+                <a:ln>
+                  <a:noFill/>
+                </a:ln>
+                <a:solidFill>
+                  <a:schemeClr val="tx1"/>
+                </a:solidFill>
+                <a:effectLst/>
+                <a:uLnTx/>
+                <a:uFillTx/>
+                <a:latin typeface="+mn-lt"/>
+                <a:ea typeface="+mn-ea"/>
+                <a:cs typeface="Tahoma" pitchFamily="34" charset="0"/>
+              </a:rPr>
+              <a:t>Driving</a:t>
+            </a:r>
+            <a:r>
+              <a:rPr kumimoji="0" lang="de-DE" sz="1000" b="0" i="0" u="none" strike="noStrike" kern="1200" cap="none" spc="0" normalizeH="0" baseline="0" noProof="0" dirty="0" smtClean="0">
+                <a:ln>
+                  <a:noFill/>
+                </a:ln>
+                <a:solidFill>
+                  <a:schemeClr val="tx1"/>
+                </a:solidFill>
+                <a:effectLst/>
+                <a:uLnTx/>
+                <a:uFillTx/>
+                <a:latin typeface="+mn-lt"/>
+                <a:ea typeface="+mn-ea"/>
+                <a:cs typeface="Tahoma" pitchFamily="34" charset="0"/>
+              </a:rPr>
+              <a:t> </a:t>
+            </a:r>
+            <a:r>
+              <a:rPr kumimoji="0" lang="de-DE" sz="1000" b="0" i="0" u="none" strike="noStrike" kern="1200" cap="none" spc="0" normalizeH="0" baseline="0" noProof="0" dirty="0" err="1" smtClean="0">
+                <a:ln>
+                  <a:noFill/>
+                </a:ln>
+                <a:solidFill>
+                  <a:schemeClr val="tx1"/>
+                </a:solidFill>
+                <a:effectLst/>
+                <a:uLnTx/>
+                <a:uFillTx/>
+                <a:latin typeface="+mn-lt"/>
+                <a:ea typeface="+mn-ea"/>
+                <a:cs typeface="Tahoma" pitchFamily="34" charset="0"/>
+              </a:rPr>
+              <a:t>Competition</a:t>
+            </a:r>
+            <a:r>
+              <a:rPr kumimoji="0" lang="de-DE" sz="1000" b="0" i="0" u="none" strike="noStrike" kern="1200" cap="none" spc="0" normalizeH="0" baseline="0" noProof="0" dirty="0" smtClean="0">
+                <a:ln>
+                  <a:noFill/>
+                </a:ln>
+                <a:solidFill>
+                  <a:schemeClr val="tx1"/>
+                </a:solidFill>
+                <a:effectLst/>
+                <a:uLnTx/>
+                <a:uFillTx/>
+                <a:latin typeface="+mn-lt"/>
+                <a:ea typeface="+mn-ea"/>
+                <a:cs typeface="Tahoma" pitchFamily="34" charset="0"/>
+              </a:rPr>
+              <a:t>“ | </a:t>
             </a:r>
             <a:fld id="{8E9B2640-8CD7-45FF-9440-54608BC46479}" type="slidenum">
               <a:rPr kumimoji="0" lang="de-DE" sz="1000" b="0" i="0" u="none" strike="noStrike" kern="1200" cap="none" spc="0" normalizeH="0" baseline="0" noProof="0" smtClean="0">
@@ -27939,6 +28092,88 @@
           </a:p>
         </p:txBody>
       </p:sp>
+      <p:pic>
+        <p:nvPicPr>
+          <p:cNvPr id="21" name="Picture 2" descr="https://upload.wikimedia.org/wikipedia/commons/thumb/5/59/SAP_2011_logo.svg/640px-SAP_2011_logo.svg.png"/>
+          <p:cNvPicPr>
+            <a:picLocks noChangeAspect="1" noChangeArrowheads="1"/>
+          </p:cNvPicPr>
+          <p:nvPr userDrawn="1"/>
+        </p:nvPicPr>
+        <p:blipFill>
+          <a:blip r:embed="rId3" cstate="print">
+            <a:extLst>
+              <a:ext uri="{28A0092B-C50C-407E-A947-70E740481C1C}">
+                <a14:useLocalDpi xmlns:a14="http://schemas.microsoft.com/office/drawing/2010/main" val="0"/>
+              </a:ext>
+            </a:extLst>
+          </a:blip>
+          <a:srcRect/>
+          <a:stretch>
+            <a:fillRect/>
+          </a:stretch>
+        </p:blipFill>
+        <p:spPr bwMode="auto">
+          <a:xfrm>
+            <a:off x="7074523" y="6426027"/>
+            <a:ext cx="665829" cy="338133"/>
+          </a:xfrm>
+          <a:prstGeom prst="rect">
+            <a:avLst/>
+          </a:prstGeom>
+          <a:noFill/>
+          <a:extLst>
+            <a:ext uri="{909E8E84-426E-40DD-AFC4-6F175D3DCCD1}">
+              <a14:hiddenFill xmlns:a14="http://schemas.microsoft.com/office/drawing/2010/main">
+                <a:solidFill>
+                  <a:srgbClr val="FFFFFF"/>
+                </a:solidFill>
+              </a14:hiddenFill>
+            </a:ext>
+          </a:extLst>
+        </p:spPr>
+      </p:pic>
+      <p:pic>
+        <p:nvPicPr>
+          <p:cNvPr id="22" name="Picture 2" descr="http://www.is.tu-darmstadt.de/media/bwl5_is/WI_182x0.jpg"/>
+          <p:cNvPicPr>
+            <a:picLocks noChangeAspect="1" noChangeArrowheads="1"/>
+          </p:cNvPicPr>
+          <p:nvPr userDrawn="1"/>
+        </p:nvPicPr>
+        <p:blipFill>
+          <a:blip r:embed="rId4" cstate="print">
+            <a:extLst>
+              <a:ext uri="{28A0092B-C50C-407E-A947-70E740481C1C}">
+                <a14:useLocalDpi xmlns:a14="http://schemas.microsoft.com/office/drawing/2010/main" val="0"/>
+              </a:ext>
+            </a:extLst>
+          </a:blip>
+          <a:srcRect/>
+          <a:stretch>
+            <a:fillRect/>
+          </a:stretch>
+        </p:blipFill>
+        <p:spPr bwMode="auto">
+          <a:xfrm>
+            <a:off x="7884368" y="6376813"/>
+            <a:ext cx="957281" cy="436563"/>
+          </a:xfrm>
+          <a:prstGeom prst="rect">
+            <a:avLst/>
+          </a:prstGeom>
+          <a:noFill/>
+          <a:extLst>
+            <a:ext uri="{909E8E84-426E-40DD-AFC4-6F175D3DCCD1}">
+              <a14:hiddenFill xmlns:a14="http://schemas.microsoft.com/office/drawing/2010/main">
+                <a:solidFill>
+                  <a:srgbClr val="FFFFFF"/>
+                </a:solidFill>
+              </a14:hiddenFill>
+            </a:ext>
+          </a:extLst>
+        </p:spPr>
+      </p:pic>
     </p:spTree>
   </p:cSld>
   <p:clrMapOvr>
@@ -28197,7 +28432,7 @@
         <p:spPr>
           <a:xfrm>
             <a:off x="363284" y="1012741"/>
-            <a:ext cx="6640875" cy="328027"/>
+            <a:ext cx="6945020" cy="328027"/>
           </a:xfrm>
           <a:noFill/>
           <a:ln w="9525">
@@ -28217,6 +28452,9 @@
           <a:lstStyle>
             <a:lvl1pPr>
               <a:defRPr lang="de-DE" sz="1800" b="0" dirty="0">
+                <a:solidFill>
+                  <a:srgbClr val="C00000"/>
+                </a:solidFill>
                 <a:ea typeface="+mj-ea"/>
               </a:defRPr>
             </a:lvl1pPr>
@@ -28263,7 +28501,7 @@
       </p:par>
     </p:tnLst>
   </p:timing>
-  <p:extLst>
+  <p:extLst mod="1">
     <p:ext uri="{DCECCB84-F9BA-43D5-87BE-67443E8EF086}">
       <p15:sldGuideLst xmlns:p15="http://schemas.microsoft.com/office/powerpoint/2012/main">
         <p15:guide id="1" orient="horz" pos="2160" userDrawn="1">
@@ -29367,7 +29605,7 @@
             <a:avLst/>
           </a:prstGeom>
           <a:solidFill>
-            <a:schemeClr val="accent2"/>
+            <a:srgbClr val="005AA9"/>
           </a:solidFill>
           <a:ln w="3175">
             <a:noFill/>
@@ -29622,7 +29860,160 @@
                 <a:ea typeface="+mn-ea"/>
                 <a:cs typeface="Tahoma" pitchFamily="34" charset="0"/>
               </a:rPr>
-              <a:t>  |  Fachbereich BBBBB  |  Institut AAAA  |  Prof. TTTTTT  |  </a:t>
+              <a:t>  |  Fachbereich </a:t>
+            </a:r>
+            <a:r>
+              <a:rPr kumimoji="0" lang="de-DE" sz="1000" b="0" i="0" u="none" strike="noStrike" kern="1200" cap="none" spc="0" normalizeH="0" baseline="0" noProof="0" dirty="0" smtClean="0">
+                <a:ln>
+                  <a:noFill/>
+                </a:ln>
+                <a:solidFill>
+                  <a:schemeClr val="tx1"/>
+                </a:solidFill>
+                <a:effectLst/>
+                <a:uLnTx/>
+                <a:uFillTx/>
+                <a:latin typeface="+mn-lt"/>
+                <a:ea typeface="+mn-ea"/>
+                <a:cs typeface="Tahoma" pitchFamily="34" charset="0"/>
+              </a:rPr>
+              <a:t>1 |  Prof</a:t>
+            </a:r>
+            <a:r>
+              <a:rPr kumimoji="0" lang="de-DE" sz="1000" b="0" i="0" u="none" strike="noStrike" kern="1200" cap="none" spc="0" normalizeH="0" baseline="0" noProof="0" dirty="0" smtClean="0">
+                <a:ln>
+                  <a:noFill/>
+                </a:ln>
+                <a:solidFill>
+                  <a:schemeClr val="tx1"/>
+                </a:solidFill>
+                <a:effectLst/>
+                <a:uLnTx/>
+                <a:uFillTx/>
+                <a:latin typeface="+mn-lt"/>
+                <a:ea typeface="+mn-ea"/>
+                <a:cs typeface="Tahoma" pitchFamily="34" charset="0"/>
+              </a:rPr>
+              <a:t>. </a:t>
+            </a:r>
+            <a:r>
+              <a:rPr kumimoji="0" lang="de-DE" sz="1000" b="0" i="0" u="none" strike="noStrike" kern="1200" cap="none" spc="0" normalizeH="0" baseline="0" noProof="0" dirty="0" smtClean="0">
+                <a:ln>
+                  <a:noFill/>
+                </a:ln>
+                <a:solidFill>
+                  <a:schemeClr val="tx1"/>
+                </a:solidFill>
+                <a:effectLst/>
+                <a:uLnTx/>
+                <a:uFillTx/>
+                <a:latin typeface="+mn-lt"/>
+                <a:ea typeface="+mn-ea"/>
+                <a:cs typeface="Tahoma" pitchFamily="34" charset="0"/>
+              </a:rPr>
+              <a:t>Dr. </a:t>
+            </a:r>
+            <a:r>
+              <a:rPr kumimoji="0" lang="de-DE" sz="1000" b="0" i="0" u="none" strike="noStrike" kern="1200" cap="none" spc="0" normalizeH="0" baseline="0" noProof="0" dirty="0" err="1" smtClean="0">
+                <a:ln>
+                  <a:noFill/>
+                </a:ln>
+                <a:solidFill>
+                  <a:schemeClr val="tx1"/>
+                </a:solidFill>
+                <a:effectLst/>
+                <a:uLnTx/>
+                <a:uFillTx/>
+                <a:latin typeface="+mn-lt"/>
+                <a:ea typeface="+mn-ea"/>
+                <a:cs typeface="Tahoma" pitchFamily="34" charset="0"/>
+              </a:rPr>
+              <a:t>Buxmann</a:t>
+            </a:r>
+            <a:r>
+              <a:rPr kumimoji="0" lang="de-DE" sz="1000" b="0" i="0" u="none" strike="noStrike" kern="1200" cap="none" spc="0" normalizeH="0" baseline="0" noProof="0" dirty="0" smtClean="0">
+                <a:ln>
+                  <a:noFill/>
+                </a:ln>
+                <a:solidFill>
+                  <a:schemeClr val="tx1"/>
+                </a:solidFill>
+                <a:effectLst/>
+                <a:uLnTx/>
+                <a:uFillTx/>
+                <a:latin typeface="+mn-lt"/>
+                <a:ea typeface="+mn-ea"/>
+                <a:cs typeface="Tahoma" pitchFamily="34" charset="0"/>
+              </a:rPr>
+              <a:t> | Projekt: „ </a:t>
+            </a:r>
+            <a:r>
+              <a:rPr kumimoji="0" lang="de-DE" sz="1000" b="0" i="0" u="none" strike="noStrike" kern="1200" cap="none" spc="0" normalizeH="0" baseline="0" noProof="0" dirty="0" err="1" smtClean="0">
+                <a:ln>
+                  <a:noFill/>
+                </a:ln>
+                <a:solidFill>
+                  <a:schemeClr val="tx1"/>
+                </a:solidFill>
+                <a:effectLst/>
+                <a:uLnTx/>
+                <a:uFillTx/>
+                <a:latin typeface="+mn-lt"/>
+                <a:ea typeface="+mn-ea"/>
+                <a:cs typeface="Tahoma" pitchFamily="34" charset="0"/>
+              </a:rPr>
+              <a:t>Driving</a:t>
+            </a:r>
+            <a:r>
+              <a:rPr kumimoji="0" lang="de-DE" sz="1000" b="0" i="0" u="none" strike="noStrike" kern="1200" cap="none" spc="0" normalizeH="0" baseline="0" noProof="0" dirty="0" smtClean="0">
+                <a:ln>
+                  <a:noFill/>
+                </a:ln>
+                <a:solidFill>
+                  <a:schemeClr val="tx1"/>
+                </a:solidFill>
+                <a:effectLst/>
+                <a:uLnTx/>
+                <a:uFillTx/>
+                <a:latin typeface="+mn-lt"/>
+                <a:ea typeface="+mn-ea"/>
+                <a:cs typeface="Tahoma" pitchFamily="34" charset="0"/>
+              </a:rPr>
+              <a:t> </a:t>
+            </a:r>
+            <a:r>
+              <a:rPr kumimoji="0" lang="de-DE" sz="1000" b="0" i="0" u="none" strike="noStrike" kern="1200" cap="none" spc="0" normalizeH="0" baseline="0" noProof="0" dirty="0" err="1" smtClean="0">
+                <a:ln>
+                  <a:noFill/>
+                </a:ln>
+                <a:solidFill>
+                  <a:schemeClr val="tx1"/>
+                </a:solidFill>
+                <a:effectLst/>
+                <a:uLnTx/>
+                <a:uFillTx/>
+                <a:latin typeface="+mn-lt"/>
+                <a:ea typeface="+mn-ea"/>
+                <a:cs typeface="Tahoma" pitchFamily="34" charset="0"/>
+              </a:rPr>
+              <a:t>Competition</a:t>
+            </a:r>
+            <a:r>
+              <a:rPr kumimoji="0" lang="de-DE" sz="1000" b="0" i="0" u="none" strike="noStrike" kern="1200" cap="none" spc="0" normalizeH="0" baseline="0" noProof="0" dirty="0" smtClean="0">
+                <a:ln>
+                  <a:noFill/>
+                </a:ln>
+                <a:solidFill>
+                  <a:schemeClr val="tx1"/>
+                </a:solidFill>
+                <a:effectLst/>
+                <a:uLnTx/>
+                <a:uFillTx/>
+                <a:latin typeface="+mn-lt"/>
+                <a:ea typeface="+mn-ea"/>
+                <a:cs typeface="Tahoma" pitchFamily="34" charset="0"/>
+              </a:rPr>
+              <a:t>“ | </a:t>
             </a:r>
             <a:fld id="{8E9B2640-8CD7-45FF-9440-54608BC46479}" type="slidenum">
               <a:rPr kumimoji="0" lang="de-DE" sz="1000" b="0" i="0" u="none" strike="noStrike" kern="1200" cap="none" spc="0" normalizeH="0" baseline="0" noProof="0" smtClean="0">
@@ -29708,6 +30099,88 @@
           </a:p>
         </p:txBody>
       </p:sp>
+      <p:pic>
+        <p:nvPicPr>
+          <p:cNvPr id="12" name="Picture 2" descr="https://upload.wikimedia.org/wikipedia/commons/thumb/5/59/SAP_2011_logo.svg/640px-SAP_2011_logo.svg.png"/>
+          <p:cNvPicPr>
+            <a:picLocks noChangeAspect="1" noChangeArrowheads="1"/>
+          </p:cNvPicPr>
+          <p:nvPr userDrawn="1"/>
+        </p:nvPicPr>
+        <p:blipFill>
+          <a:blip r:embed="rId12" cstate="print">
+            <a:extLst>
+              <a:ext uri="{28A0092B-C50C-407E-A947-70E740481C1C}">
+                <a14:useLocalDpi xmlns:a14="http://schemas.microsoft.com/office/drawing/2010/main" val="0"/>
+              </a:ext>
+            </a:extLst>
+          </a:blip>
+          <a:srcRect/>
+          <a:stretch>
+            <a:fillRect/>
+          </a:stretch>
+        </p:blipFill>
+        <p:spPr bwMode="auto">
+          <a:xfrm>
+            <a:off x="7074523" y="6426027"/>
+            <a:ext cx="665829" cy="338133"/>
+          </a:xfrm>
+          <a:prstGeom prst="rect">
+            <a:avLst/>
+          </a:prstGeom>
+          <a:noFill/>
+          <a:extLst>
+            <a:ext uri="{909E8E84-426E-40DD-AFC4-6F175D3DCCD1}">
+              <a14:hiddenFill xmlns:a14="http://schemas.microsoft.com/office/drawing/2010/main">
+                <a:solidFill>
+                  <a:srgbClr val="FFFFFF"/>
+                </a:solidFill>
+              </a14:hiddenFill>
+            </a:ext>
+          </a:extLst>
+        </p:spPr>
+      </p:pic>
+      <p:pic>
+        <p:nvPicPr>
+          <p:cNvPr id="2" name="Picture 2" descr="http://www.is.tu-darmstadt.de/media/bwl5_is/WI_182x0.jpg"/>
+          <p:cNvPicPr>
+            <a:picLocks noChangeAspect="1" noChangeArrowheads="1"/>
+          </p:cNvPicPr>
+          <p:nvPr userDrawn="1"/>
+        </p:nvPicPr>
+        <p:blipFill>
+          <a:blip r:embed="rId13" cstate="print">
+            <a:extLst>
+              <a:ext uri="{28A0092B-C50C-407E-A947-70E740481C1C}">
+                <a14:useLocalDpi xmlns:a14="http://schemas.microsoft.com/office/drawing/2010/main" val="0"/>
+              </a:ext>
+            </a:extLst>
+          </a:blip>
+          <a:srcRect/>
+          <a:stretch>
+            <a:fillRect/>
+          </a:stretch>
+        </p:blipFill>
+        <p:spPr bwMode="auto">
+          <a:xfrm>
+            <a:off x="7884368" y="6376813"/>
+            <a:ext cx="957281" cy="436563"/>
+          </a:xfrm>
+          <a:prstGeom prst="rect">
+            <a:avLst/>
+          </a:prstGeom>
+          <a:noFill/>
+          <a:extLst>
+            <a:ext uri="{909E8E84-426E-40DD-AFC4-6F175D3DCCD1}">
+              <a14:hiddenFill xmlns:a14="http://schemas.microsoft.com/office/drawing/2010/main">
+                <a:solidFill>
+                  <a:srgbClr val="FFFFFF"/>
+                </a:solidFill>
+              </a14:hiddenFill>
+            </a:ext>
+          </a:extLst>
+        </p:spPr>
+      </p:pic>
     </p:spTree>
   </p:cSld>
   <p:clrMap bg1="lt1" tx1="dk1" bg2="lt2" tx2="dk2" accent1="accent1" accent2="accent2" accent3="accent3" accent4="accent4" accent5="accent5" accent6="accent6" hlink="hlink" folHlink="folHlink"/>
@@ -29749,7 +30222,7 @@
         </a:spcAft>
         <a:defRPr sz="2400" b="1">
           <a:solidFill>
-            <a:schemeClr val="tx1"/>
+            <a:srgbClr val="005AA9"/>
           </a:solidFill>
           <a:latin typeface="+mn-lt"/>
           <a:ea typeface="+mj-ea"/>
@@ -30162,18 +30635,50 @@
             <p:ph type="subTitle" idx="1"/>
           </p:nvPr>
         </p:nvSpPr>
-        <p:spPr/>
+        <p:spPr>
+          <a:xfrm>
+            <a:off x="358775" y="1449388"/>
+            <a:ext cx="8533705" cy="944562"/>
+          </a:xfrm>
+        </p:spPr>
         <p:txBody>
           <a:bodyPr/>
           <a:lstStyle/>
           <a:p>
+            <a:pPr>
+              <a:lnSpc>
+                <a:spcPct val="150000"/>
+              </a:lnSpc>
+            </a:pPr>
             <a:r>
-              <a:rPr lang="de-DE" sz="2800" b="0" dirty="0" smtClean="0"/>
-              <a:t>Big Data Seminar</a:t>
+              <a:rPr lang="de-DE" dirty="0" smtClean="0"/>
+              <a:t>Big Data </a:t>
             </a:r>
+            <a:r>
+              <a:rPr lang="de-DE" dirty="0" smtClean="0"/>
+              <a:t>Seminar: Die Nutzung von Fahrzeugbezogenen Sensordaten</a:t>
+            </a:r>
+            <a:endParaRPr lang="de-DE" dirty="0" smtClean="0"/>
           </a:p>
           <a:p>
-            <a:endParaRPr lang="de-DE" sz="2800" b="0" dirty="0"/>
+            <a:pPr>
+              <a:lnSpc>
+                <a:spcPct val="150000"/>
+              </a:lnSpc>
+            </a:pPr>
+            <a:r>
+              <a:rPr lang="de-DE" sz="1400" dirty="0" smtClean="0"/>
+              <a:t>Max </a:t>
+            </a:r>
+            <a:r>
+              <a:rPr lang="de-DE" sz="1400" dirty="0" err="1" smtClean="0"/>
+              <a:t>Kolhagen</a:t>
+            </a:r>
+            <a:r>
+              <a:rPr lang="de-DE" sz="1400" dirty="0" smtClean="0"/>
+              <a:t>, Markus Braun, Young-Hwan Kim</a:t>
+            </a:r>
+            <a:endParaRPr lang="de-DE" sz="1400" dirty="0"/>
           </a:p>
         </p:txBody>
       </p:sp>
@@ -30193,22 +30698,34 @@
           <a:lstStyle/>
           <a:p>
             <a:r>
-              <a:rPr lang="de-DE" sz="3200" dirty="0" smtClean="0"/>
-              <a:t>Project: </a:t>
+              <a:rPr lang="de-DE" sz="3400" dirty="0" smtClean="0"/>
+              <a:t>Projekt</a:t>
             </a:r>
             <a:r>
-              <a:rPr lang="de-DE" sz="3200" dirty="0" err="1" smtClean="0"/>
+              <a:rPr lang="de-DE" sz="3400" dirty="0"/>
+              <a:t>: </a:t>
+            </a:r>
+            <a:r>
+              <a:rPr lang="de-DE" sz="3400" dirty="0" smtClean="0"/>
+              <a:t>„</a:t>
+            </a:r>
+            <a:r>
+              <a:rPr lang="de-DE" sz="3400" dirty="0" err="1" smtClean="0"/>
               <a:t>Driving</a:t>
             </a:r>
             <a:r>
-              <a:rPr lang="de-DE" sz="3200" dirty="0" smtClean="0"/>
+              <a:rPr lang="de-DE" sz="3400" dirty="0" smtClean="0"/>
               <a:t> </a:t>
             </a:r>
             <a:r>
-              <a:rPr lang="de-DE" sz="3200" dirty="0" err="1"/>
+              <a:rPr lang="de-DE" sz="3400" dirty="0" err="1"/>
               <a:t>Competition</a:t>
             </a:r>
-            <a:endParaRPr lang="de-DE" sz="3200" dirty="0"/>
+            <a:r>
+              <a:rPr lang="de-DE" sz="3400" dirty="0"/>
+              <a:t>“</a:t>
+            </a:r>
+            <a:endParaRPr lang="de-DE" sz="3400" dirty="0"/>
           </a:p>
         </p:txBody>
       </p:sp>
@@ -30670,7 +31187,6 @@
               <a:rPr lang="de-DE" dirty="0" smtClean="0"/>
               <a:t>Wir bedanken uns für die Aufmerksamkeit und </a:t>
             </a:r>
-            <a:endParaRPr lang="de-DE" dirty="0" smtClean="0"/>
           </a:p>
           <a:p>
             <a:pPr>
@@ -30680,11 +31196,7 @@
             </a:pPr>
             <a:r>
               <a:rPr lang="de-DE" dirty="0" smtClean="0"/>
-              <a:t>hoffen </a:t>
-            </a:r>
-            <a:r>
-              <a:rPr lang="de-DE" dirty="0" smtClean="0"/>
-              <a:t>auf eine rege Diskussion</a:t>
+              <a:t>hoffen auf eine rege Diskussion</a:t>
             </a:r>
             <a:endParaRPr lang="de-DE" dirty="0"/>
           </a:p>
@@ -30741,11 +31253,11 @@
   <p:clrMapOvr>
     <a:masterClrMapping/>
   </p:clrMapOvr>
-  <mc:AlternateContent xmlns:mc="http://schemas.openxmlformats.org/markup-compatibility/2006">
-    <mc:Choice xmlns:p14="http://schemas.microsoft.com/office/powerpoint/2010/main" Requires="p14">
+  <mc:AlternateContent xmlns:mc="http://schemas.openxmlformats.org/markup-compatibility/2006" xmlns:p14="http://schemas.microsoft.com/office/powerpoint/2010/main">
+    <mc:Choice Requires="p14">
       <p:transition p14:dur="10"/>
     </mc:Choice>
-    <mc:Fallback>
+    <mc:Fallback xmlns="">
       <p:transition/>
     </mc:Fallback>
   </mc:AlternateContent>

</xml_diff>

<commit_message>
Präsi: update details.js: gear round to second deci
</commit_message>
<xml_diff>
--- a/Big Data - Driving Compitiion.pptx
+++ b/Big Data - Driving Compitiion.pptx
@@ -4875,11 +4875,7 @@
         <a:p>
           <a:r>
             <a:rPr lang="de-DE" dirty="0" smtClean="0"/>
-            <a:t>Die zukünftige </a:t>
-          </a:r>
-          <a:r>
-            <a:rPr lang="de-DE" dirty="0" smtClean="0"/>
-            <a:t>Vision</a:t>
+            <a:t>Die zukünftige Vision</a:t>
           </a:r>
           <a:endParaRPr lang="de-DE" dirty="0"/>
         </a:p>
@@ -6912,20 +6908,20 @@
     </dgm:pt>
   </dgm:ptLst>
   <dgm:cxnLst>
+    <dgm:cxn modelId="{DF551E1B-31BD-424B-BDF9-2FEE5CDEED18}" type="presOf" srcId="{38321699-6EAC-4AD8-B27B-ACE7FFF262B6}" destId="{94DED9F9-7D3B-4917-A97F-E1AEF1F131EB}" srcOrd="0" destOrd="0" presId="urn:microsoft.com/office/officeart/2008/layout/VerticalCurvedList"/>
+    <dgm:cxn modelId="{F7B64BD6-EEFF-4977-B51C-F5FE13DE21C3}" type="presOf" srcId="{A51BC3B9-C6C3-4F90-8DEB-5FC00F55FAC3}" destId="{8ECB0D0F-B2D2-4899-8B78-A157CB1D3F6B}" srcOrd="0" destOrd="0" presId="urn:microsoft.com/office/officeart/2008/layout/VerticalCurvedList"/>
+    <dgm:cxn modelId="{E5759E99-E475-4200-9CE5-3F48B76A4C63}" type="presOf" srcId="{E95D953B-8834-475B-A90B-21464208104B}" destId="{5A5522D5-98B1-431C-862A-87D2AE6B6114}" srcOrd="0" destOrd="0" presId="urn:microsoft.com/office/officeart/2008/layout/VerticalCurvedList"/>
+    <dgm:cxn modelId="{B14053D7-E653-4001-9CED-ED4C0F94E826}" srcId="{95ECB77F-7E75-47E2-90C0-5B0DDC98D652}" destId="{87FB8AC5-8D3E-434D-AA2A-E691E1044F11}" srcOrd="5" destOrd="0" parTransId="{A0DC7861-C700-42E9-8572-8B1FF4A58B77}" sibTransId="{9C7B8D6A-BBF2-4B91-8536-09DDEF0950F6}"/>
+    <dgm:cxn modelId="{5FFF2D33-36D0-4732-A286-FA07F795F7FA}" srcId="{95ECB77F-7E75-47E2-90C0-5B0DDC98D652}" destId="{E95D953B-8834-475B-A90B-21464208104B}" srcOrd="3" destOrd="0" parTransId="{C7327062-E855-4EA7-B7F4-A7CA52F2DE57}" sibTransId="{B343315B-0F53-472F-A3F8-50E72C394E69}"/>
     <dgm:cxn modelId="{BEE2EB47-2855-42D2-AA03-68D6E06CEB79}" type="presOf" srcId="{45060046-6D24-4053-9722-CE27E4945F11}" destId="{1846E345-4193-43B8-A89A-FBAC2DEA3CE1}" srcOrd="0" destOrd="0" presId="urn:microsoft.com/office/officeart/2008/layout/VerticalCurvedList"/>
+    <dgm:cxn modelId="{516620AF-1C2B-4D03-AE69-7700D0655FC5}" srcId="{95ECB77F-7E75-47E2-90C0-5B0DDC98D652}" destId="{A51BC3B9-C6C3-4F90-8DEB-5FC00F55FAC3}" srcOrd="1" destOrd="0" parTransId="{FB4C850F-ADB2-4038-934D-454F131BB747}" sibTransId="{533DBDD4-7C73-461F-8E6E-7024B084AA9F}"/>
+    <dgm:cxn modelId="{47C04417-86FC-498B-BD14-77393C10C1DC}" type="presOf" srcId="{CD0833F7-E376-457D-A71E-09FC73BFF92B}" destId="{08F8990D-49AD-4487-90C5-A481D9A36092}" srcOrd="0" destOrd="0" presId="urn:microsoft.com/office/officeart/2008/layout/VerticalCurvedList"/>
+    <dgm:cxn modelId="{ADF612EB-E1AA-456A-A7A3-4C37D446752B}" type="presOf" srcId="{1A926AD4-CAE4-4101-AE8D-570B2C62378B}" destId="{506FFCA4-4592-4809-88A7-98FA0A62B2FE}" srcOrd="0" destOrd="0" presId="urn:microsoft.com/office/officeart/2008/layout/VerticalCurvedList"/>
+    <dgm:cxn modelId="{54C22A2C-2957-4E5B-A799-CEBDB2F2B3D6}" srcId="{95ECB77F-7E75-47E2-90C0-5B0DDC98D652}" destId="{45060046-6D24-4053-9722-CE27E4945F11}" srcOrd="4" destOrd="0" parTransId="{0C22DB43-AD4A-47E8-8690-7A0FC81803F9}" sibTransId="{9A98F613-EA9F-4553-902A-79CBE73C9130}"/>
+    <dgm:cxn modelId="{FAAB1983-77ED-4E7E-9B95-58C230122AE5}" srcId="{95ECB77F-7E75-47E2-90C0-5B0DDC98D652}" destId="{38321699-6EAC-4AD8-B27B-ACE7FFF262B6}" srcOrd="0" destOrd="0" parTransId="{BD4F7070-97CC-40EF-8C99-9322B9CA6DB3}" sibTransId="{1A926AD4-CAE4-4101-AE8D-570B2C62378B}"/>
+    <dgm:cxn modelId="{41854B80-A3E4-4FD5-A103-D70420420B0A}" type="presOf" srcId="{95ECB77F-7E75-47E2-90C0-5B0DDC98D652}" destId="{38E64900-0655-49A7-81A8-CBE292ECC20A}" srcOrd="0" destOrd="0" presId="urn:microsoft.com/office/officeart/2008/layout/VerticalCurvedList"/>
     <dgm:cxn modelId="{72457938-9B53-4279-B462-CAD957A50A6C}" srcId="{95ECB77F-7E75-47E2-90C0-5B0DDC98D652}" destId="{CD0833F7-E376-457D-A71E-09FC73BFF92B}" srcOrd="2" destOrd="0" parTransId="{D846FAC5-99A1-44AD-AC9F-8D26D376FDD3}" sibTransId="{3DA33939-57E8-47EE-992C-63D2CAB2022F}"/>
     <dgm:cxn modelId="{78A1B226-F0EC-4BEB-B691-BCF0BB22434D}" type="presOf" srcId="{87FB8AC5-8D3E-434D-AA2A-E691E1044F11}" destId="{34EAC2A8-ED4F-47AB-ABA4-B15FD3670046}" srcOrd="0" destOrd="0" presId="urn:microsoft.com/office/officeart/2008/layout/VerticalCurvedList"/>
-    <dgm:cxn modelId="{DF551E1B-31BD-424B-BDF9-2FEE5CDEED18}" type="presOf" srcId="{38321699-6EAC-4AD8-B27B-ACE7FFF262B6}" destId="{94DED9F9-7D3B-4917-A97F-E1AEF1F131EB}" srcOrd="0" destOrd="0" presId="urn:microsoft.com/office/officeart/2008/layout/VerticalCurvedList"/>
-    <dgm:cxn modelId="{516620AF-1C2B-4D03-AE69-7700D0655FC5}" srcId="{95ECB77F-7E75-47E2-90C0-5B0DDC98D652}" destId="{A51BC3B9-C6C3-4F90-8DEB-5FC00F55FAC3}" srcOrd="1" destOrd="0" parTransId="{FB4C850F-ADB2-4038-934D-454F131BB747}" sibTransId="{533DBDD4-7C73-461F-8E6E-7024B084AA9F}"/>
-    <dgm:cxn modelId="{5FFF2D33-36D0-4732-A286-FA07F795F7FA}" srcId="{95ECB77F-7E75-47E2-90C0-5B0DDC98D652}" destId="{E95D953B-8834-475B-A90B-21464208104B}" srcOrd="3" destOrd="0" parTransId="{C7327062-E855-4EA7-B7F4-A7CA52F2DE57}" sibTransId="{B343315B-0F53-472F-A3F8-50E72C394E69}"/>
-    <dgm:cxn modelId="{FAAB1983-77ED-4E7E-9B95-58C230122AE5}" srcId="{95ECB77F-7E75-47E2-90C0-5B0DDC98D652}" destId="{38321699-6EAC-4AD8-B27B-ACE7FFF262B6}" srcOrd="0" destOrd="0" parTransId="{BD4F7070-97CC-40EF-8C99-9322B9CA6DB3}" sibTransId="{1A926AD4-CAE4-4101-AE8D-570B2C62378B}"/>
-    <dgm:cxn modelId="{B14053D7-E653-4001-9CED-ED4C0F94E826}" srcId="{95ECB77F-7E75-47E2-90C0-5B0DDC98D652}" destId="{87FB8AC5-8D3E-434D-AA2A-E691E1044F11}" srcOrd="5" destOrd="0" parTransId="{A0DC7861-C700-42E9-8572-8B1FF4A58B77}" sibTransId="{9C7B8D6A-BBF2-4B91-8536-09DDEF0950F6}"/>
-    <dgm:cxn modelId="{47C04417-86FC-498B-BD14-77393C10C1DC}" type="presOf" srcId="{CD0833F7-E376-457D-A71E-09FC73BFF92B}" destId="{08F8990D-49AD-4487-90C5-A481D9A36092}" srcOrd="0" destOrd="0" presId="urn:microsoft.com/office/officeart/2008/layout/VerticalCurvedList"/>
-    <dgm:cxn modelId="{E5759E99-E475-4200-9CE5-3F48B76A4C63}" type="presOf" srcId="{E95D953B-8834-475B-A90B-21464208104B}" destId="{5A5522D5-98B1-431C-862A-87D2AE6B6114}" srcOrd="0" destOrd="0" presId="urn:microsoft.com/office/officeart/2008/layout/VerticalCurvedList"/>
-    <dgm:cxn modelId="{54C22A2C-2957-4E5B-A799-CEBDB2F2B3D6}" srcId="{95ECB77F-7E75-47E2-90C0-5B0DDC98D652}" destId="{45060046-6D24-4053-9722-CE27E4945F11}" srcOrd="4" destOrd="0" parTransId="{0C22DB43-AD4A-47E8-8690-7A0FC81803F9}" sibTransId="{9A98F613-EA9F-4553-902A-79CBE73C9130}"/>
-    <dgm:cxn modelId="{F7B64BD6-EEFF-4977-B51C-F5FE13DE21C3}" type="presOf" srcId="{A51BC3B9-C6C3-4F90-8DEB-5FC00F55FAC3}" destId="{8ECB0D0F-B2D2-4899-8B78-A157CB1D3F6B}" srcOrd="0" destOrd="0" presId="urn:microsoft.com/office/officeart/2008/layout/VerticalCurvedList"/>
-    <dgm:cxn modelId="{ADF612EB-E1AA-456A-A7A3-4C37D446752B}" type="presOf" srcId="{1A926AD4-CAE4-4101-AE8D-570B2C62378B}" destId="{506FFCA4-4592-4809-88A7-98FA0A62B2FE}" srcOrd="0" destOrd="0" presId="urn:microsoft.com/office/officeart/2008/layout/VerticalCurvedList"/>
-    <dgm:cxn modelId="{41854B80-A3E4-4FD5-A103-D70420420B0A}" type="presOf" srcId="{95ECB77F-7E75-47E2-90C0-5B0DDC98D652}" destId="{38E64900-0655-49A7-81A8-CBE292ECC20A}" srcOrd="0" destOrd="0" presId="urn:microsoft.com/office/officeart/2008/layout/VerticalCurvedList"/>
     <dgm:cxn modelId="{BB80A6C9-B112-4391-9AB4-1F3016E8C408}" type="presParOf" srcId="{38E64900-0655-49A7-81A8-CBE292ECC20A}" destId="{41921527-D604-4B3C-B292-C3FAC710B6E0}" srcOrd="0" destOrd="0" presId="urn:microsoft.com/office/officeart/2008/layout/VerticalCurvedList"/>
     <dgm:cxn modelId="{1423987F-98D3-470D-AAF2-60D4097EA5F5}" type="presParOf" srcId="{41921527-D604-4B3C-B292-C3FAC710B6E0}" destId="{24F548E7-AE07-4894-BADE-1F0E78FED5F2}" srcOrd="0" destOrd="0" presId="urn:microsoft.com/office/officeart/2008/layout/VerticalCurvedList"/>
     <dgm:cxn modelId="{28225234-F0F5-4313-A2C5-9E32A9EE7094}" type="presParOf" srcId="{24F548E7-AE07-4894-BADE-1F0E78FED5F2}" destId="{85B14CF3-E044-4530-B837-51EB3D31E253}" srcOrd="0" destOrd="0" presId="urn:microsoft.com/office/officeart/2008/layout/VerticalCurvedList"/>
@@ -8552,11 +8548,7 @@
           </a:pPr>
           <a:r>
             <a:rPr lang="de-DE" sz="2600" kern="1200" dirty="0" smtClean="0"/>
-            <a:t>Die zukünftige </a:t>
-          </a:r>
-          <a:r>
-            <a:rPr lang="de-DE" sz="2600" kern="1200" dirty="0" smtClean="0"/>
-            <a:t>Vision</a:t>
+            <a:t>Die zukünftige Vision</a:t>
           </a:r>
           <a:endParaRPr lang="de-DE" sz="2600" kern="1200" dirty="0"/>
         </a:p>
@@ -30995,7 +30987,7 @@
           <a:p>
             <a:r>
               <a:rPr lang="de-DE" dirty="0" smtClean="0"/>
-              <a:t>Umsetzung, Änderung und Anwendung</a:t>
+              <a:t>Veränderung, Verbesserung und Erweiterung</a:t>
             </a:r>
             <a:endParaRPr lang="de-DE" dirty="0"/>
           </a:p>
@@ -31481,13 +31473,8 @@
           <a:p>
             <a:r>
               <a:rPr lang="de-DE" dirty="0" smtClean="0"/>
-              <a:t>Durch einen </a:t>
+              <a:t>Durch einen „spielerische“ und unternehmensinternen Mitarbeiterwettbewerb sollen die Mitarbeiter dazu angehalten werden Vorsichtiger und „Effizienter“ zu fahren:</a:t>
             </a:r>
-            <a:r>
-              <a:rPr lang="de-DE" dirty="0" smtClean="0"/>
-              <a:t>„spielerische“ und unternehmensinternen Mitarbeiterwettbewerb sollen die Mitarbeiter dazu angehalten werden Vorsichtiger und „Effizienter“ zu fahren:</a:t>
-            </a:r>
-            <a:endParaRPr lang="de-DE" dirty="0" smtClean="0"/>
           </a:p>
           <a:p>
             <a:pPr marL="342900" indent="-342900">
@@ -31496,19 +31483,7 @@
             </a:pPr>
             <a:r>
               <a:rPr lang="de-DE" dirty="0" smtClean="0"/>
-              <a:t>Kleinere Boni </a:t>
-            </a:r>
-            <a:r>
-              <a:rPr lang="de-DE" dirty="0" smtClean="0"/>
-              <a:t>/ Geschenke für </a:t>
-            </a:r>
-            <a:r>
-              <a:rPr lang="de-DE" dirty="0" smtClean="0"/>
-              <a:t>eine sichere </a:t>
-            </a:r>
-            <a:r>
-              <a:rPr lang="de-DE" dirty="0" smtClean="0"/>
-              <a:t>und effiziente Fahrweisen (pro Monat / </a:t>
+              <a:t>Kleinere Boni / Geschenke für eine sichere und effiziente Fahrweisen (pro Monat / </a:t>
             </a:r>
             <a:r>
               <a:rPr lang="de-DE" strike="sngStrike" dirty="0" smtClean="0"/>
@@ -31526,29 +31501,8 @@
             </a:pPr>
             <a:r>
               <a:rPr lang="de-DE" dirty="0" smtClean="0"/>
-              <a:t>geringe Abnutzung / Kosten durch </a:t>
+              <a:t>geringe Abnutzung / Kosten durch ineffiziente und waghalsige Fahrweisen können mittels Mitarbeitermotivation verringert werden</a:t>
             </a:r>
-            <a:r>
-              <a:rPr lang="de-DE" dirty="0" smtClean="0"/>
-              <a:t>ineffiziente und waghalsige</a:t>
-            </a:r>
-            <a:r>
-              <a:rPr lang="de-DE" dirty="0" smtClean="0"/>
-              <a:t> Fahrweisen können </a:t>
-            </a:r>
-            <a:r>
-              <a:rPr lang="de-DE" dirty="0" smtClean="0"/>
-              <a:t>mittels </a:t>
-            </a:r>
-            <a:r>
-              <a:rPr lang="de-DE" dirty="0" smtClean="0"/>
-              <a:t>Mitarbeitermotivation </a:t>
-            </a:r>
-            <a:r>
-              <a:rPr lang="de-DE" dirty="0" smtClean="0"/>
-              <a:t>verringert werden</a:t>
-            </a:r>
-            <a:endParaRPr lang="de-DE" dirty="0" smtClean="0"/>
           </a:p>
           <a:p>
             <a:pPr marL="342900" indent="-342900">
@@ -31786,11 +31740,7 @@
             </a:r>
             <a:r>
               <a:rPr lang="de-DE" dirty="0" smtClean="0"/>
-              <a:t> / </a:t>
-            </a:r>
-            <a:r>
-              <a:rPr lang="de-DE" dirty="0" smtClean="0"/>
-              <a:t>Glättungsfaktoren</a:t>
+              <a:t> / Glättungsfaktoren</a:t>
             </a:r>
           </a:p>
           <a:p>
@@ -31815,22 +31765,12 @@
               <a:rPr lang="de-DE" dirty="0" smtClean="0"/>
               <a:t>UI -&gt; benutzerfreundlich / einfach </a:t>
             </a:r>
-            <a:endParaRPr lang="de-DE" dirty="0" smtClean="0"/>
           </a:p>
           <a:p>
             <a:r>
               <a:rPr lang="de-DE" dirty="0" smtClean="0"/>
-              <a:t>Ziel: geringer </a:t>
+              <a:t>Ziel: geringer Kostenaufwand für die Implementierung und Umsetzung für die unternehmensinterne Nutzung</a:t>
             </a:r>
-            <a:r>
-              <a:rPr lang="de-DE" dirty="0" smtClean="0"/>
-              <a:t>Kostenaufwand für die </a:t>
-            </a:r>
-            <a:r>
-              <a:rPr lang="de-DE" dirty="0" smtClean="0"/>
-              <a:t>Implementierung und Umsetzung für die unternehmensinterne Nutzung</a:t>
-            </a:r>
-            <a:endParaRPr lang="de-DE" dirty="0" smtClean="0"/>
           </a:p>
           <a:p>
             <a:endParaRPr lang="de-DE" dirty="0" smtClean="0"/>

</xml_diff>